<commit_message>
i promise this is the last race. the last race. the last one. the not penultmate, the last one.
</commit_message>
<xml_diff>
--- a/OuterData/Махницкий диплом.pptx
+++ b/OuterData/Махницкий диплом.pptx
@@ -5,7 +5,7 @@
     <p:sldMasterId id="2147483648" r:id="rId1"/>
   </p:sldMasterIdLst>
   <p:notesMasterIdLst>
-    <p:notesMasterId r:id="rId15"/>
+    <p:notesMasterId r:id="rId29"/>
   </p:notesMasterIdLst>
   <p:sldIdLst>
     <p:sldId id="392" r:id="rId2"/>
@@ -18,9 +18,23 @@
     <p:sldId id="405" r:id="rId9"/>
     <p:sldId id="294" r:id="rId10"/>
     <p:sldId id="406" r:id="rId11"/>
-    <p:sldId id="311" r:id="rId12"/>
-    <p:sldId id="403" r:id="rId13"/>
-    <p:sldId id="335" r:id="rId14"/>
+    <p:sldId id="408" r:id="rId12"/>
+    <p:sldId id="411" r:id="rId13"/>
+    <p:sldId id="407" r:id="rId14"/>
+    <p:sldId id="414" r:id="rId15"/>
+    <p:sldId id="412" r:id="rId16"/>
+    <p:sldId id="420" r:id="rId17"/>
+    <p:sldId id="413" r:id="rId18"/>
+    <p:sldId id="415" r:id="rId19"/>
+    <p:sldId id="421" r:id="rId20"/>
+    <p:sldId id="422" r:id="rId21"/>
+    <p:sldId id="418" r:id="rId22"/>
+    <p:sldId id="417" r:id="rId23"/>
+    <p:sldId id="419" r:id="rId24"/>
+    <p:sldId id="311" r:id="rId25"/>
+    <p:sldId id="403" r:id="rId26"/>
+    <p:sldId id="424" r:id="rId27"/>
+    <p:sldId id="335" r:id="rId28"/>
   </p:sldIdLst>
   <p:sldSz cx="24384000" cy="13716000"/>
   <p:notesSz cx="9928225" cy="6797675"/>
@@ -337,8 +351,22 @@
             <p14:sldId id="405"/>
             <p14:sldId id="294"/>
             <p14:sldId id="406"/>
+            <p14:sldId id="408"/>
+            <p14:sldId id="411"/>
+            <p14:sldId id="407"/>
+            <p14:sldId id="414"/>
+            <p14:sldId id="412"/>
+            <p14:sldId id="420"/>
+            <p14:sldId id="413"/>
+            <p14:sldId id="415"/>
+            <p14:sldId id="421"/>
+            <p14:sldId id="422"/>
+            <p14:sldId id="418"/>
+            <p14:sldId id="417"/>
+            <p14:sldId id="419"/>
             <p14:sldId id="311"/>
             <p14:sldId id="403"/>
+            <p14:sldId id="424"/>
             <p14:sldId id="335"/>
           </p14:sldIdLst>
         </p14:section>
@@ -3666,7 +3694,7 @@
             <a:fld id="{9015A16B-6D6F-7E43-8715-9A6C2BF58A22}" type="datetime1">
               <a:rPr lang="ru-RU" smtClean="0"/>
               <a:pPr/>
-              <a:t>08.06.2025</a:t>
+              <a:t>13.06.2025</a:t>
             </a:fld>
             <a:endParaRPr lang="ru-RU"/>
           </a:p>
@@ -5066,7 +5094,7 @@
           </a:ln>
           <a:extLst>
             <a:ext uri="{C572A759-6A51-4108-AA02-DFA0A04FC94B}">
-              <ma14:wrappingTextBoxFlag xmlns="" xmlns:m="http://schemas.openxmlformats.org/officeDocument/2006/math" xmlns:a14="http://schemas.microsoft.com/office/drawing/2010/main" xmlns:ma14="http://schemas.microsoft.com/office/mac/drawingml/2011/main" val="1"/>
+              <ma14:wrappingTextBoxFlag xmlns:ma14="http://schemas.microsoft.com/office/mac/drawingml/2011/main" xmlns:a14="http://schemas.microsoft.com/office/drawing/2010/main" xmlns:m="http://schemas.openxmlformats.org/officeDocument/2006/math" xmlns="" val="1"/>
             </a:ext>
           </a:extLst>
         </p:spPr>
@@ -5126,7 +5154,7 @@
           </a:ln>
           <a:extLst>
             <a:ext uri="{C572A759-6A51-4108-AA02-DFA0A04FC94B}">
-              <ma14:wrappingTextBoxFlag xmlns="" xmlns:m="http://schemas.openxmlformats.org/officeDocument/2006/math" xmlns:a14="http://schemas.microsoft.com/office/drawing/2010/main" xmlns:ma14="http://schemas.microsoft.com/office/mac/drawingml/2011/main" val="1"/>
+              <ma14:wrappingTextBoxFlag xmlns:ma14="http://schemas.microsoft.com/office/mac/drawingml/2011/main" xmlns:a14="http://schemas.microsoft.com/office/drawing/2010/main" xmlns:m="http://schemas.openxmlformats.org/officeDocument/2006/math" xmlns="" val="1"/>
             </a:ext>
           </a:extLst>
         </p:spPr>
@@ -5223,6 +5251,154 @@
   <p:clrMapOvr>
     <a:masterClrMapping/>
   </p:clrMapOvr>
+  <mc:AlternateContent xmlns:mc="http://schemas.openxmlformats.org/markup-compatibility/2006" xmlns:p14="http://schemas.microsoft.com/office/powerpoint/2010/main">
+    <mc:Choice Requires="p14">
+      <p:transition spd="med" p14:dur="700">
+        <p:fade/>
+      </p:transition>
+    </mc:Choice>
+    <mc:Fallback xmlns="">
+      <p:transition spd="med">
+        <p:fade/>
+      </p:transition>
+    </mc:Fallback>
+  </mc:AlternateContent>
+</p:sld>
+</file>
+
+<file path=ppt/slides/slide11.xml><?xml version="1.0" encoding="utf-8"?>
+<p:sld xmlns:a="http://schemas.openxmlformats.org/drawingml/2006/main" xmlns:r="http://schemas.openxmlformats.org/officeDocument/2006/relationships" xmlns:p="http://schemas.openxmlformats.org/presentationml/2006/main" showMasterSp="0">
+  <p:cSld>
+    <p:spTree>
+      <p:nvGrpSpPr>
+        <p:cNvPr id="1" name="">
+          <a:extLst>
+            <a:ext uri="{FF2B5EF4-FFF2-40B4-BE49-F238E27FC236}">
+              <a16:creationId xmlns:a16="http://schemas.microsoft.com/office/drawing/2014/main" id="{886B22CE-C1E8-1D93-206B-14DDC7BAF75C}"/>
+            </a:ext>
+          </a:extLst>
+        </p:cNvPr>
+        <p:cNvGrpSpPr/>
+        <p:nvPr/>
+      </p:nvGrpSpPr>
+      <p:grpSpPr>
+        <a:xfrm>
+          <a:off x="0" y="0"/>
+          <a:ext cx="0" cy="0"/>
+          <a:chOff x="0" y="0"/>
+          <a:chExt cx="0" cy="0"/>
+        </a:xfrm>
+      </p:grpSpPr>
+      <p:sp>
+        <p:nvSpPr>
+          <p:cNvPr id="1640" name="PESTLE Analysis">
+            <a:extLst>
+              <a:ext uri="{FF2B5EF4-FFF2-40B4-BE49-F238E27FC236}">
+                <a16:creationId xmlns:a16="http://schemas.microsoft.com/office/drawing/2014/main" id="{99135B2C-08DC-32D7-2A98-7DA5FEB7F92D}"/>
+              </a:ext>
+            </a:extLst>
+          </p:cNvPr>
+          <p:cNvSpPr txBox="1"/>
+          <p:nvPr/>
+        </p:nvSpPr>
+        <p:spPr>
+          <a:xfrm>
+            <a:off x="2787948" y="49705"/>
+            <a:ext cx="18910472" cy="1333700"/>
+          </a:xfrm>
+          <a:prstGeom prst="rect">
+            <a:avLst/>
+          </a:prstGeom>
+          <a:ln w="12700">
+            <a:solidFill>
+              <a:schemeClr val="tx1"/>
+            </a:solidFill>
+            <a:miter lim="400000"/>
+          </a:ln>
+          <a:extLst>
+            <a:ext uri="{C572A759-6A51-4108-AA02-DFA0A04FC94B}">
+              <ma14:wrappingTextBoxFlag xmlns="" xmlns:m="http://schemas.openxmlformats.org/officeDocument/2006/math" xmlns:a14="http://schemas.microsoft.com/office/drawing/2010/main" xmlns:ma14="http://schemas.microsoft.com/office/mac/drawingml/2011/main" val="1"/>
+            </a:ext>
+          </a:extLst>
+        </p:spPr>
+        <p:txBody>
+          <a:bodyPr wrap="square" lIns="50801" tIns="50801" rIns="50801" bIns="50801">
+            <a:spAutoFit/>
+          </a:bodyPr>
+          <a:lstStyle>
+            <a:lvl1pPr algn="l">
+              <a:defRPr sz="8000" b="0">
+                <a:solidFill>
+                  <a:srgbClr val="242423"/>
+                </a:solidFill>
+                <a:latin typeface="Montserrat Bold"/>
+                <a:ea typeface="Montserrat Bold"/>
+                <a:cs typeface="Montserrat Bold"/>
+                <a:sym typeface="Montserrat Bold"/>
+              </a:defRPr>
+            </a:lvl1pPr>
+          </a:lstStyle>
+          <a:p>
+            <a:r>
+              <a:rPr lang="ru-RU" b="1" dirty="0">
+                <a:solidFill>
+                  <a:schemeClr val="tx1"/>
+                </a:solidFill>
+                <a:latin typeface="Arial" panose="020B0604020202020204" pitchFamily="34" charset="0"/>
+                <a:cs typeface="Arial" panose="020B0604020202020204" pitchFamily="34" charset="0"/>
+              </a:rPr>
+              <a:t>Списковая страница поиска товаров</a:t>
+            </a:r>
+            <a:endParaRPr b="1" dirty="0">
+              <a:solidFill>
+                <a:schemeClr val="tx1"/>
+              </a:solidFill>
+              <a:latin typeface="Arial" panose="020B0604020202020204" pitchFamily="34" charset="0"/>
+              <a:cs typeface="Arial" panose="020B0604020202020204" pitchFamily="34" charset="0"/>
+            </a:endParaRPr>
+          </a:p>
+        </p:txBody>
+      </p:sp>
+      <p:pic>
+        <p:nvPicPr>
+          <p:cNvPr id="4" name="Рисунок 3">
+            <a:extLst>
+              <a:ext uri="{FF2B5EF4-FFF2-40B4-BE49-F238E27FC236}">
+                <a16:creationId xmlns:a16="http://schemas.microsoft.com/office/drawing/2014/main" id="{B88C90AF-4C03-49E5-AABE-201378B7F39E}"/>
+              </a:ext>
+            </a:extLst>
+          </p:cNvPr>
+          <p:cNvPicPr>
+            <a:picLocks noChangeAspect="1"/>
+          </p:cNvPicPr>
+          <p:nvPr/>
+        </p:nvPicPr>
+        <p:blipFill>
+          <a:blip r:embed="rId2"/>
+          <a:stretch>
+            <a:fillRect/>
+          </a:stretch>
+        </p:blipFill>
+        <p:spPr>
+          <a:xfrm>
+            <a:off x="227874" y="1649506"/>
+            <a:ext cx="24030621" cy="12066494"/>
+          </a:xfrm>
+          <a:prstGeom prst="rect">
+            <a:avLst/>
+          </a:prstGeom>
+        </p:spPr>
+      </p:pic>
+    </p:spTree>
+    <p:extLst>
+      <p:ext uri="{BB962C8B-B14F-4D97-AF65-F5344CB8AC3E}">
+        <p14:creationId xmlns:p14="http://schemas.microsoft.com/office/powerpoint/2010/main" val="125404017"/>
+      </p:ext>
+    </p:extLst>
+  </p:cSld>
+  <p:clrMapOvr>
+    <a:masterClrMapping/>
+  </p:clrMapOvr>
   <mc:AlternateContent xmlns:mc="http://schemas.openxmlformats.org/markup-compatibility/2006">
     <mc:Choice xmlns:p14="http://schemas.microsoft.com/office/powerpoint/2010/main" Requires="p14">
       <p:transition spd="med" p14:dur="700">
@@ -5238,7 +5414,1992 @@
 </p:sld>
 </file>
 
-<file path=ppt/slides/slide11.xml><?xml version="1.0" encoding="utf-8"?>
+<file path=ppt/slides/slide12.xml><?xml version="1.0" encoding="utf-8"?>
+<p:sld xmlns:a="http://schemas.openxmlformats.org/drawingml/2006/main" xmlns:r="http://schemas.openxmlformats.org/officeDocument/2006/relationships" xmlns:p="http://schemas.openxmlformats.org/presentationml/2006/main" showMasterSp="0">
+  <p:cSld>
+    <p:spTree>
+      <p:nvGrpSpPr>
+        <p:cNvPr id="1" name="">
+          <a:extLst>
+            <a:ext uri="{FF2B5EF4-FFF2-40B4-BE49-F238E27FC236}">
+              <a16:creationId xmlns:a16="http://schemas.microsoft.com/office/drawing/2014/main" id="{F77C94EE-8DD3-76E2-BB2D-372D5518512E}"/>
+            </a:ext>
+          </a:extLst>
+        </p:cNvPr>
+        <p:cNvGrpSpPr/>
+        <p:nvPr/>
+      </p:nvGrpSpPr>
+      <p:grpSpPr>
+        <a:xfrm>
+          <a:off x="0" y="0"/>
+          <a:ext cx="0" cy="0"/>
+          <a:chOff x="0" y="0"/>
+          <a:chExt cx="0" cy="0"/>
+        </a:xfrm>
+      </p:grpSpPr>
+      <p:sp>
+        <p:nvSpPr>
+          <p:cNvPr id="1640" name="PESTLE Analysis">
+            <a:extLst>
+              <a:ext uri="{FF2B5EF4-FFF2-40B4-BE49-F238E27FC236}">
+                <a16:creationId xmlns:a16="http://schemas.microsoft.com/office/drawing/2014/main" id="{0D33BD3D-CB97-E3DF-8C1E-9375F0FF071E}"/>
+              </a:ext>
+            </a:extLst>
+          </p:cNvPr>
+          <p:cNvSpPr txBox="1"/>
+          <p:nvPr/>
+        </p:nvSpPr>
+        <p:spPr>
+          <a:xfrm>
+            <a:off x="5023635" y="0"/>
+            <a:ext cx="14425515" cy="1333700"/>
+          </a:xfrm>
+          <a:prstGeom prst="rect">
+            <a:avLst/>
+          </a:prstGeom>
+          <a:ln w="12700">
+            <a:solidFill>
+              <a:schemeClr val="tx1"/>
+            </a:solidFill>
+            <a:miter lim="400000"/>
+          </a:ln>
+          <a:extLst>
+            <a:ext uri="{C572A759-6A51-4108-AA02-DFA0A04FC94B}">
+              <ma14:wrappingTextBoxFlag xmlns:ma14="http://schemas.microsoft.com/office/mac/drawingml/2011/main" xmlns:a14="http://schemas.microsoft.com/office/drawing/2010/main" xmlns:m="http://schemas.openxmlformats.org/officeDocument/2006/math" xmlns="" val="1"/>
+            </a:ext>
+          </a:extLst>
+        </p:spPr>
+        <p:txBody>
+          <a:bodyPr wrap="square" lIns="50801" tIns="50801" rIns="50801" bIns="50801">
+            <a:spAutoFit/>
+          </a:bodyPr>
+          <a:lstStyle>
+            <a:lvl1pPr algn="l">
+              <a:defRPr sz="8000" b="0">
+                <a:solidFill>
+                  <a:srgbClr val="242423"/>
+                </a:solidFill>
+                <a:latin typeface="Montserrat Bold"/>
+                <a:ea typeface="Montserrat Bold"/>
+                <a:cs typeface="Montserrat Bold"/>
+                <a:sym typeface="Montserrat Bold"/>
+              </a:defRPr>
+            </a:lvl1pPr>
+          </a:lstStyle>
+          <a:p>
+            <a:r>
+              <a:rPr lang="ru-RU" b="1" dirty="0">
+                <a:solidFill>
+                  <a:schemeClr val="tx1"/>
+                </a:solidFill>
+                <a:latin typeface="Arial" panose="020B0604020202020204" pitchFamily="34" charset="0"/>
+                <a:cs typeface="Arial" panose="020B0604020202020204" pitchFamily="34" charset="0"/>
+              </a:rPr>
+              <a:t>Детальная страница товара</a:t>
+            </a:r>
+            <a:endParaRPr b="1" dirty="0">
+              <a:solidFill>
+                <a:schemeClr val="tx1"/>
+              </a:solidFill>
+              <a:latin typeface="Arial" panose="020B0604020202020204" pitchFamily="34" charset="0"/>
+              <a:cs typeface="Arial" panose="020B0604020202020204" pitchFamily="34" charset="0"/>
+            </a:endParaRPr>
+          </a:p>
+        </p:txBody>
+      </p:sp>
+      <p:pic>
+        <p:nvPicPr>
+          <p:cNvPr id="3" name="Рисунок 2">
+            <a:extLst>
+              <a:ext uri="{FF2B5EF4-FFF2-40B4-BE49-F238E27FC236}">
+                <a16:creationId xmlns:a16="http://schemas.microsoft.com/office/drawing/2014/main" id="{C3E4B0C4-1E14-03CF-0E49-125695AA6E87}"/>
+              </a:ext>
+            </a:extLst>
+          </p:cNvPr>
+          <p:cNvPicPr>
+            <a:picLocks noChangeAspect="1"/>
+          </p:cNvPicPr>
+          <p:nvPr/>
+        </p:nvPicPr>
+        <p:blipFill>
+          <a:blip r:embed="rId2"/>
+          <a:stretch>
+            <a:fillRect/>
+          </a:stretch>
+        </p:blipFill>
+        <p:spPr>
+          <a:xfrm>
+            <a:off x="-1" y="1367518"/>
+            <a:ext cx="24472789" cy="12314666"/>
+          </a:xfrm>
+          <a:prstGeom prst="rect">
+            <a:avLst/>
+          </a:prstGeom>
+        </p:spPr>
+      </p:pic>
+    </p:spTree>
+    <p:extLst>
+      <p:ext uri="{BB962C8B-B14F-4D97-AF65-F5344CB8AC3E}">
+        <p14:creationId xmlns:p14="http://schemas.microsoft.com/office/powerpoint/2010/main" val="1365978128"/>
+      </p:ext>
+    </p:extLst>
+  </p:cSld>
+  <p:clrMapOvr>
+    <a:masterClrMapping/>
+  </p:clrMapOvr>
+  <mc:AlternateContent xmlns:mc="http://schemas.openxmlformats.org/markup-compatibility/2006">
+    <mc:Choice xmlns:p14="http://schemas.microsoft.com/office/powerpoint/2010/main" Requires="p14">
+      <p:transition spd="med" p14:dur="700">
+        <p:fade/>
+      </p:transition>
+    </mc:Choice>
+    <mc:Fallback>
+      <p:transition spd="med">
+        <p:fade/>
+      </p:transition>
+    </mc:Fallback>
+  </mc:AlternateContent>
+</p:sld>
+</file>
+
+<file path=ppt/slides/slide13.xml><?xml version="1.0" encoding="utf-8"?>
+<p:sld xmlns:a="http://schemas.openxmlformats.org/drawingml/2006/main" xmlns:r="http://schemas.openxmlformats.org/officeDocument/2006/relationships" xmlns:p="http://schemas.openxmlformats.org/presentationml/2006/main" showMasterSp="0">
+  <p:cSld>
+    <p:spTree>
+      <p:nvGrpSpPr>
+        <p:cNvPr id="1" name="">
+          <a:extLst>
+            <a:ext uri="{FF2B5EF4-FFF2-40B4-BE49-F238E27FC236}">
+              <a16:creationId xmlns:a16="http://schemas.microsoft.com/office/drawing/2014/main" id="{2916BE76-91D9-E3AD-DA36-65375F57A05B}"/>
+            </a:ext>
+          </a:extLst>
+        </p:cNvPr>
+        <p:cNvGrpSpPr/>
+        <p:nvPr/>
+      </p:nvGrpSpPr>
+      <p:grpSpPr>
+        <a:xfrm>
+          <a:off x="0" y="0"/>
+          <a:ext cx="0" cy="0"/>
+          <a:chOff x="0" y="0"/>
+          <a:chExt cx="0" cy="0"/>
+        </a:xfrm>
+      </p:grpSpPr>
+      <p:sp>
+        <p:nvSpPr>
+          <p:cNvPr id="1640" name="PESTLE Analysis">
+            <a:extLst>
+              <a:ext uri="{FF2B5EF4-FFF2-40B4-BE49-F238E27FC236}">
+                <a16:creationId xmlns:a16="http://schemas.microsoft.com/office/drawing/2014/main" id="{0DBC67D9-CA75-CEA4-DE8C-83F05369E45C}"/>
+              </a:ext>
+            </a:extLst>
+          </p:cNvPr>
+          <p:cNvSpPr txBox="1"/>
+          <p:nvPr/>
+        </p:nvSpPr>
+        <p:spPr>
+          <a:xfrm>
+            <a:off x="2953870" y="124963"/>
+            <a:ext cx="18476259" cy="1333700"/>
+          </a:xfrm>
+          <a:prstGeom prst="rect">
+            <a:avLst/>
+          </a:prstGeom>
+          <a:ln w="12700">
+            <a:solidFill>
+              <a:schemeClr val="tx1"/>
+            </a:solidFill>
+            <a:miter lim="400000"/>
+          </a:ln>
+          <a:extLst>
+            <a:ext uri="{C572A759-6A51-4108-AA02-DFA0A04FC94B}">
+              <ma14:wrappingTextBoxFlag xmlns:ma14="http://schemas.microsoft.com/office/mac/drawingml/2011/main" xmlns:a14="http://schemas.microsoft.com/office/drawing/2010/main" xmlns:m="http://schemas.openxmlformats.org/officeDocument/2006/math" xmlns="" val="1"/>
+            </a:ext>
+          </a:extLst>
+        </p:spPr>
+        <p:txBody>
+          <a:bodyPr wrap="square" lIns="50801" tIns="50801" rIns="50801" bIns="50801">
+            <a:spAutoFit/>
+          </a:bodyPr>
+          <a:lstStyle>
+            <a:lvl1pPr algn="l">
+              <a:defRPr sz="8000" b="0">
+                <a:solidFill>
+                  <a:srgbClr val="242423"/>
+                </a:solidFill>
+                <a:latin typeface="Montserrat Bold"/>
+                <a:ea typeface="Montserrat Bold"/>
+                <a:cs typeface="Montserrat Bold"/>
+                <a:sym typeface="Montserrat Bold"/>
+              </a:defRPr>
+            </a:lvl1pPr>
+          </a:lstStyle>
+          <a:p>
+            <a:r>
+              <a:rPr lang="ru-RU" b="1" dirty="0">
+                <a:solidFill>
+                  <a:schemeClr val="tx1"/>
+                </a:solidFill>
+                <a:latin typeface="Arial" panose="020B0604020202020204" pitchFamily="34" charset="0"/>
+                <a:cs typeface="Arial" panose="020B0604020202020204" pitchFamily="34" charset="0"/>
+              </a:rPr>
+              <a:t>Списковая страница поиска продаж</a:t>
+            </a:r>
+            <a:endParaRPr b="1" dirty="0">
+              <a:solidFill>
+                <a:schemeClr val="tx1"/>
+              </a:solidFill>
+              <a:latin typeface="Arial" panose="020B0604020202020204" pitchFamily="34" charset="0"/>
+              <a:cs typeface="Arial" panose="020B0604020202020204" pitchFamily="34" charset="0"/>
+            </a:endParaRPr>
+          </a:p>
+        </p:txBody>
+      </p:sp>
+      <p:pic>
+        <p:nvPicPr>
+          <p:cNvPr id="18" name="Рисунок 17">
+            <a:extLst>
+              <a:ext uri="{FF2B5EF4-FFF2-40B4-BE49-F238E27FC236}">
+                <a16:creationId xmlns:a16="http://schemas.microsoft.com/office/drawing/2014/main" id="{F703EC80-2C74-92DE-23F2-DC0B62737025}"/>
+              </a:ext>
+            </a:extLst>
+          </p:cNvPr>
+          <p:cNvPicPr>
+            <a:picLocks noChangeAspect="1"/>
+          </p:cNvPicPr>
+          <p:nvPr/>
+        </p:nvPicPr>
+        <p:blipFill>
+          <a:blip r:embed="rId2"/>
+          <a:stretch>
+            <a:fillRect/>
+          </a:stretch>
+        </p:blipFill>
+        <p:spPr>
+          <a:xfrm>
+            <a:off x="0" y="1602098"/>
+            <a:ext cx="24384000" cy="12257337"/>
+          </a:xfrm>
+          <a:prstGeom prst="rect">
+            <a:avLst/>
+          </a:prstGeom>
+        </p:spPr>
+      </p:pic>
+    </p:spTree>
+    <p:extLst>
+      <p:ext uri="{BB962C8B-B14F-4D97-AF65-F5344CB8AC3E}">
+        <p14:creationId xmlns:p14="http://schemas.microsoft.com/office/powerpoint/2010/main" val="3819562230"/>
+      </p:ext>
+    </p:extLst>
+  </p:cSld>
+  <p:clrMapOvr>
+    <a:masterClrMapping/>
+  </p:clrMapOvr>
+  <mc:AlternateContent xmlns:mc="http://schemas.openxmlformats.org/markup-compatibility/2006">
+    <mc:Choice xmlns:p14="http://schemas.microsoft.com/office/powerpoint/2010/main" Requires="p14">
+      <p:transition spd="med" p14:dur="700">
+        <p:fade/>
+      </p:transition>
+    </mc:Choice>
+    <mc:Fallback>
+      <p:transition spd="med">
+        <p:fade/>
+      </p:transition>
+    </mc:Fallback>
+  </mc:AlternateContent>
+</p:sld>
+</file>
+
+<file path=ppt/slides/slide14.xml><?xml version="1.0" encoding="utf-8"?>
+<p:sld xmlns:a="http://schemas.openxmlformats.org/drawingml/2006/main" xmlns:r="http://schemas.openxmlformats.org/officeDocument/2006/relationships" xmlns:p="http://schemas.openxmlformats.org/presentationml/2006/main" showMasterSp="0">
+  <p:cSld>
+    <p:spTree>
+      <p:nvGrpSpPr>
+        <p:cNvPr id="1" name="">
+          <a:extLst>
+            <a:ext uri="{FF2B5EF4-FFF2-40B4-BE49-F238E27FC236}">
+              <a16:creationId xmlns:a16="http://schemas.microsoft.com/office/drawing/2014/main" id="{64CCD6C7-36DA-EF36-07D5-3365F4E0EE2E}"/>
+            </a:ext>
+          </a:extLst>
+        </p:cNvPr>
+        <p:cNvGrpSpPr/>
+        <p:nvPr/>
+      </p:nvGrpSpPr>
+      <p:grpSpPr>
+        <a:xfrm>
+          <a:off x="0" y="0"/>
+          <a:ext cx="0" cy="0"/>
+          <a:chOff x="0" y="0"/>
+          <a:chExt cx="0" cy="0"/>
+        </a:xfrm>
+      </p:grpSpPr>
+      <p:sp>
+        <p:nvSpPr>
+          <p:cNvPr id="1640" name="PESTLE Analysis">
+            <a:extLst>
+              <a:ext uri="{FF2B5EF4-FFF2-40B4-BE49-F238E27FC236}">
+                <a16:creationId xmlns:a16="http://schemas.microsoft.com/office/drawing/2014/main" id="{4A5C88E9-1C3B-6F99-6AC4-E3128B5C8DEA}"/>
+              </a:ext>
+            </a:extLst>
+          </p:cNvPr>
+          <p:cNvSpPr txBox="1"/>
+          <p:nvPr/>
+        </p:nvSpPr>
+        <p:spPr>
+          <a:xfrm>
+            <a:off x="4500282" y="177666"/>
+            <a:ext cx="15383435" cy="1333700"/>
+          </a:xfrm>
+          <a:prstGeom prst="rect">
+            <a:avLst/>
+          </a:prstGeom>
+          <a:ln w="12700">
+            <a:solidFill>
+              <a:schemeClr val="tx1"/>
+            </a:solidFill>
+            <a:miter lim="400000"/>
+          </a:ln>
+          <a:extLst>
+            <a:ext uri="{C572A759-6A51-4108-AA02-DFA0A04FC94B}">
+              <ma14:wrappingTextBoxFlag xmlns="" xmlns:m="http://schemas.openxmlformats.org/officeDocument/2006/math" xmlns:a14="http://schemas.microsoft.com/office/drawing/2010/main" xmlns:ma14="http://schemas.microsoft.com/office/mac/drawingml/2011/main" val="1"/>
+            </a:ext>
+          </a:extLst>
+        </p:spPr>
+        <p:txBody>
+          <a:bodyPr wrap="square" lIns="50801" tIns="50801" rIns="50801" bIns="50801">
+            <a:spAutoFit/>
+          </a:bodyPr>
+          <a:lstStyle>
+            <a:lvl1pPr algn="l">
+              <a:defRPr sz="8000" b="0">
+                <a:solidFill>
+                  <a:srgbClr val="242423"/>
+                </a:solidFill>
+                <a:latin typeface="Montserrat Bold"/>
+                <a:ea typeface="Montserrat Bold"/>
+                <a:cs typeface="Montserrat Bold"/>
+                <a:sym typeface="Montserrat Bold"/>
+              </a:defRPr>
+            </a:lvl1pPr>
+          </a:lstStyle>
+          <a:p>
+            <a:r>
+              <a:rPr lang="ru-RU" b="1" dirty="0">
+                <a:solidFill>
+                  <a:schemeClr val="tx1"/>
+                </a:solidFill>
+                <a:latin typeface="Arial" panose="020B0604020202020204" pitchFamily="34" charset="0"/>
+                <a:cs typeface="Arial" panose="020B0604020202020204" pitchFamily="34" charset="0"/>
+              </a:rPr>
+              <a:t>Детальная страница продажи</a:t>
+            </a:r>
+            <a:endParaRPr b="1" dirty="0">
+              <a:solidFill>
+                <a:schemeClr val="tx1"/>
+              </a:solidFill>
+              <a:latin typeface="Arial" panose="020B0604020202020204" pitchFamily="34" charset="0"/>
+              <a:cs typeface="Arial" panose="020B0604020202020204" pitchFamily="34" charset="0"/>
+            </a:endParaRPr>
+          </a:p>
+        </p:txBody>
+      </p:sp>
+      <p:pic>
+        <p:nvPicPr>
+          <p:cNvPr id="3" name="Рисунок 2">
+            <a:extLst>
+              <a:ext uri="{FF2B5EF4-FFF2-40B4-BE49-F238E27FC236}">
+                <a16:creationId xmlns:a16="http://schemas.microsoft.com/office/drawing/2014/main" id="{8A0E7555-A971-0910-5679-854273074B0F}"/>
+              </a:ext>
+            </a:extLst>
+          </p:cNvPr>
+          <p:cNvPicPr>
+            <a:picLocks noChangeAspect="1"/>
+          </p:cNvPicPr>
+          <p:nvPr/>
+        </p:nvPicPr>
+        <p:blipFill>
+          <a:blip r:embed="rId2"/>
+          <a:stretch>
+            <a:fillRect/>
+          </a:stretch>
+        </p:blipFill>
+        <p:spPr>
+          <a:xfrm>
+            <a:off x="0" y="1699866"/>
+            <a:ext cx="24240565" cy="12016134"/>
+          </a:xfrm>
+          <a:prstGeom prst="rect">
+            <a:avLst/>
+          </a:prstGeom>
+        </p:spPr>
+      </p:pic>
+    </p:spTree>
+    <p:extLst>
+      <p:ext uri="{BB962C8B-B14F-4D97-AF65-F5344CB8AC3E}">
+        <p14:creationId xmlns:p14="http://schemas.microsoft.com/office/powerpoint/2010/main" val="4186786204"/>
+      </p:ext>
+    </p:extLst>
+  </p:cSld>
+  <p:clrMapOvr>
+    <a:masterClrMapping/>
+  </p:clrMapOvr>
+  <mc:AlternateContent xmlns:mc="http://schemas.openxmlformats.org/markup-compatibility/2006">
+    <mc:Choice xmlns:p14="http://schemas.microsoft.com/office/powerpoint/2010/main" Requires="p14">
+      <p:transition spd="med" p14:dur="700">
+        <p:fade/>
+      </p:transition>
+    </mc:Choice>
+    <mc:Fallback>
+      <p:transition spd="med">
+        <p:fade/>
+      </p:transition>
+    </mc:Fallback>
+  </mc:AlternateContent>
+</p:sld>
+</file>
+
+<file path=ppt/slides/slide15.xml><?xml version="1.0" encoding="utf-8"?>
+<p:sld xmlns:a="http://schemas.openxmlformats.org/drawingml/2006/main" xmlns:r="http://schemas.openxmlformats.org/officeDocument/2006/relationships" xmlns:p="http://schemas.openxmlformats.org/presentationml/2006/main" showMasterSp="0">
+  <p:cSld>
+    <p:spTree>
+      <p:nvGrpSpPr>
+        <p:cNvPr id="1" name="">
+          <a:extLst>
+            <a:ext uri="{FF2B5EF4-FFF2-40B4-BE49-F238E27FC236}">
+              <a16:creationId xmlns:a16="http://schemas.microsoft.com/office/drawing/2014/main" id="{F093ABAB-925C-813A-EFCE-57DB0F83361F}"/>
+            </a:ext>
+          </a:extLst>
+        </p:cNvPr>
+        <p:cNvGrpSpPr/>
+        <p:nvPr/>
+      </p:nvGrpSpPr>
+      <p:grpSpPr>
+        <a:xfrm>
+          <a:off x="0" y="0"/>
+          <a:ext cx="0" cy="0"/>
+          <a:chOff x="0" y="0"/>
+          <a:chExt cx="0" cy="0"/>
+        </a:xfrm>
+      </p:grpSpPr>
+      <p:sp>
+        <p:nvSpPr>
+          <p:cNvPr id="1640" name="PESTLE Analysis">
+            <a:extLst>
+              <a:ext uri="{FF2B5EF4-FFF2-40B4-BE49-F238E27FC236}">
+                <a16:creationId xmlns:a16="http://schemas.microsoft.com/office/drawing/2014/main" id="{7118F0B4-10A2-F60D-D3CE-09585D087BA7}"/>
+              </a:ext>
+            </a:extLst>
+          </p:cNvPr>
+          <p:cNvSpPr txBox="1"/>
+          <p:nvPr/>
+        </p:nvSpPr>
+        <p:spPr>
+          <a:xfrm>
+            <a:off x="4763133" y="142350"/>
+            <a:ext cx="14796248" cy="1333700"/>
+          </a:xfrm>
+          <a:prstGeom prst="rect">
+            <a:avLst/>
+          </a:prstGeom>
+          <a:ln w="12700">
+            <a:solidFill>
+              <a:schemeClr val="tx1"/>
+            </a:solidFill>
+            <a:miter lim="400000"/>
+          </a:ln>
+          <a:extLst>
+            <a:ext uri="{C572A759-6A51-4108-AA02-DFA0A04FC94B}">
+              <ma14:wrappingTextBoxFlag xmlns="" xmlns:m="http://schemas.openxmlformats.org/officeDocument/2006/math" xmlns:a14="http://schemas.microsoft.com/office/drawing/2010/main" xmlns:ma14="http://schemas.microsoft.com/office/mac/drawingml/2011/main" val="1"/>
+            </a:ext>
+          </a:extLst>
+        </p:spPr>
+        <p:txBody>
+          <a:bodyPr wrap="square" lIns="50801" tIns="50801" rIns="50801" bIns="50801">
+            <a:spAutoFit/>
+          </a:bodyPr>
+          <a:lstStyle>
+            <a:lvl1pPr algn="l">
+              <a:defRPr sz="8000" b="0">
+                <a:solidFill>
+                  <a:srgbClr val="242423"/>
+                </a:solidFill>
+                <a:latin typeface="Montserrat Bold"/>
+                <a:ea typeface="Montserrat Bold"/>
+                <a:cs typeface="Montserrat Bold"/>
+                <a:sym typeface="Montserrat Bold"/>
+              </a:defRPr>
+            </a:lvl1pPr>
+          </a:lstStyle>
+          <a:p>
+            <a:r>
+              <a:rPr lang="ru-RU" b="1" dirty="0">
+                <a:solidFill>
+                  <a:schemeClr val="tx1"/>
+                </a:solidFill>
+                <a:latin typeface="Arial" panose="020B0604020202020204" pitchFamily="34" charset="0"/>
+                <a:cs typeface="Arial" panose="020B0604020202020204" pitchFamily="34" charset="0"/>
+              </a:rPr>
+              <a:t>Страница возврата продажи</a:t>
+            </a:r>
+            <a:endParaRPr b="1" dirty="0">
+              <a:solidFill>
+                <a:schemeClr val="tx1"/>
+              </a:solidFill>
+              <a:latin typeface="Arial" panose="020B0604020202020204" pitchFamily="34" charset="0"/>
+              <a:cs typeface="Arial" panose="020B0604020202020204" pitchFamily="34" charset="0"/>
+            </a:endParaRPr>
+          </a:p>
+        </p:txBody>
+      </p:sp>
+      <p:pic>
+        <p:nvPicPr>
+          <p:cNvPr id="3" name="Рисунок 2">
+            <a:extLst>
+              <a:ext uri="{FF2B5EF4-FFF2-40B4-BE49-F238E27FC236}">
+                <a16:creationId xmlns:a16="http://schemas.microsoft.com/office/drawing/2014/main" id="{17D25845-D060-B8AD-813D-93D2297E85D2}"/>
+              </a:ext>
+            </a:extLst>
+          </p:cNvPr>
+          <p:cNvPicPr>
+            <a:picLocks noChangeAspect="1"/>
+          </p:cNvPicPr>
+          <p:nvPr/>
+        </p:nvPicPr>
+        <p:blipFill>
+          <a:blip r:embed="rId2"/>
+          <a:stretch>
+            <a:fillRect/>
+          </a:stretch>
+        </p:blipFill>
+        <p:spPr>
+          <a:xfrm>
+            <a:off x="0" y="2438400"/>
+            <a:ext cx="24322514" cy="11152637"/>
+          </a:xfrm>
+          <a:prstGeom prst="rect">
+            <a:avLst/>
+          </a:prstGeom>
+        </p:spPr>
+      </p:pic>
+    </p:spTree>
+    <p:extLst>
+      <p:ext uri="{BB962C8B-B14F-4D97-AF65-F5344CB8AC3E}">
+        <p14:creationId xmlns:p14="http://schemas.microsoft.com/office/powerpoint/2010/main" val="2035562461"/>
+      </p:ext>
+    </p:extLst>
+  </p:cSld>
+  <p:clrMapOvr>
+    <a:masterClrMapping/>
+  </p:clrMapOvr>
+  <mc:AlternateContent xmlns:mc="http://schemas.openxmlformats.org/markup-compatibility/2006">
+    <mc:Choice xmlns:p14="http://schemas.microsoft.com/office/powerpoint/2010/main" Requires="p14">
+      <p:transition spd="med" p14:dur="700">
+        <p:fade/>
+      </p:transition>
+    </mc:Choice>
+    <mc:Fallback>
+      <p:transition spd="med">
+        <p:fade/>
+      </p:transition>
+    </mc:Fallback>
+  </mc:AlternateContent>
+</p:sld>
+</file>
+
+<file path=ppt/slides/slide16.xml><?xml version="1.0" encoding="utf-8"?>
+<p:sld xmlns:a="http://schemas.openxmlformats.org/drawingml/2006/main" xmlns:r="http://schemas.openxmlformats.org/officeDocument/2006/relationships" xmlns:p="http://schemas.openxmlformats.org/presentationml/2006/main" showMasterSp="0">
+  <p:cSld>
+    <p:spTree>
+      <p:nvGrpSpPr>
+        <p:cNvPr id="1" name="">
+          <a:extLst>
+            <a:ext uri="{FF2B5EF4-FFF2-40B4-BE49-F238E27FC236}">
+              <a16:creationId xmlns:a16="http://schemas.microsoft.com/office/drawing/2014/main" id="{83052040-3442-0093-90E6-B6DDC938AAE3}"/>
+            </a:ext>
+          </a:extLst>
+        </p:cNvPr>
+        <p:cNvGrpSpPr/>
+        <p:nvPr/>
+      </p:nvGrpSpPr>
+      <p:grpSpPr>
+        <a:xfrm>
+          <a:off x="0" y="0"/>
+          <a:ext cx="0" cy="0"/>
+          <a:chOff x="0" y="0"/>
+          <a:chExt cx="0" cy="0"/>
+        </a:xfrm>
+      </p:grpSpPr>
+      <p:sp>
+        <p:nvSpPr>
+          <p:cNvPr id="1640" name="PESTLE Analysis">
+            <a:extLst>
+              <a:ext uri="{FF2B5EF4-FFF2-40B4-BE49-F238E27FC236}">
+                <a16:creationId xmlns:a16="http://schemas.microsoft.com/office/drawing/2014/main" id="{A2D513FA-23FB-05EB-0BF8-516A29C6F1E0}"/>
+              </a:ext>
+            </a:extLst>
+          </p:cNvPr>
+          <p:cNvSpPr txBox="1"/>
+          <p:nvPr/>
+        </p:nvSpPr>
+        <p:spPr>
+          <a:xfrm>
+            <a:off x="6051805" y="63551"/>
+            <a:ext cx="12380334" cy="1333700"/>
+          </a:xfrm>
+          <a:prstGeom prst="rect">
+            <a:avLst/>
+          </a:prstGeom>
+          <a:ln w="12700">
+            <a:solidFill>
+              <a:schemeClr val="tx1"/>
+            </a:solidFill>
+            <a:miter lim="400000"/>
+          </a:ln>
+          <a:extLst>
+            <a:ext uri="{C572A759-6A51-4108-AA02-DFA0A04FC94B}">
+              <ma14:wrappingTextBoxFlag xmlns:ma14="http://schemas.microsoft.com/office/mac/drawingml/2011/main" xmlns:a14="http://schemas.microsoft.com/office/drawing/2010/main" xmlns:m="http://schemas.openxmlformats.org/officeDocument/2006/math" xmlns="" val="1"/>
+            </a:ext>
+          </a:extLst>
+        </p:spPr>
+        <p:txBody>
+          <a:bodyPr wrap="square" lIns="50801" tIns="50801" rIns="50801" bIns="50801">
+            <a:spAutoFit/>
+          </a:bodyPr>
+          <a:lstStyle>
+            <a:lvl1pPr algn="l">
+              <a:defRPr sz="8000" b="0">
+                <a:solidFill>
+                  <a:srgbClr val="242423"/>
+                </a:solidFill>
+                <a:latin typeface="Montserrat Bold"/>
+                <a:ea typeface="Montserrat Bold"/>
+                <a:cs typeface="Montserrat Bold"/>
+                <a:sym typeface="Montserrat Bold"/>
+              </a:defRPr>
+            </a:lvl1pPr>
+          </a:lstStyle>
+          <a:p>
+            <a:r>
+              <a:rPr lang="ru-RU" b="1" dirty="0">
+                <a:solidFill>
+                  <a:schemeClr val="tx1"/>
+                </a:solidFill>
+                <a:latin typeface="Arial" panose="020B0604020202020204" pitchFamily="34" charset="0"/>
+                <a:cs typeface="Arial" panose="020B0604020202020204" pitchFamily="34" charset="0"/>
+              </a:rPr>
+              <a:t>Резервное копирование</a:t>
+            </a:r>
+            <a:endParaRPr b="1" dirty="0">
+              <a:solidFill>
+                <a:schemeClr val="tx1"/>
+              </a:solidFill>
+              <a:latin typeface="Arial" panose="020B0604020202020204" pitchFamily="34" charset="0"/>
+              <a:cs typeface="Arial" panose="020B0604020202020204" pitchFamily="34" charset="0"/>
+            </a:endParaRPr>
+          </a:p>
+        </p:txBody>
+      </p:sp>
+      <p:pic>
+        <p:nvPicPr>
+          <p:cNvPr id="3" name="Рисунок 2">
+            <a:extLst>
+              <a:ext uri="{FF2B5EF4-FFF2-40B4-BE49-F238E27FC236}">
+                <a16:creationId xmlns:a16="http://schemas.microsoft.com/office/drawing/2014/main" id="{33AB2C90-A1A0-55D7-C486-5C4F3AB157DA}"/>
+              </a:ext>
+            </a:extLst>
+          </p:cNvPr>
+          <p:cNvPicPr>
+            <a:picLocks noChangeAspect="1"/>
+          </p:cNvPicPr>
+          <p:nvPr/>
+        </p:nvPicPr>
+        <p:blipFill>
+          <a:blip r:embed="rId2"/>
+          <a:stretch>
+            <a:fillRect/>
+          </a:stretch>
+        </p:blipFill>
+        <p:spPr>
+          <a:xfrm>
+            <a:off x="99944" y="2072422"/>
+            <a:ext cx="24284056" cy="9571155"/>
+          </a:xfrm>
+          <a:prstGeom prst="rect">
+            <a:avLst/>
+          </a:prstGeom>
+        </p:spPr>
+      </p:pic>
+    </p:spTree>
+    <p:extLst>
+      <p:ext uri="{BB962C8B-B14F-4D97-AF65-F5344CB8AC3E}">
+        <p14:creationId xmlns:p14="http://schemas.microsoft.com/office/powerpoint/2010/main" val="964983768"/>
+      </p:ext>
+    </p:extLst>
+  </p:cSld>
+  <p:clrMapOvr>
+    <a:masterClrMapping/>
+  </p:clrMapOvr>
+  <mc:AlternateContent xmlns:mc="http://schemas.openxmlformats.org/markup-compatibility/2006">
+    <mc:Choice xmlns:p14="http://schemas.microsoft.com/office/powerpoint/2010/main" Requires="p14">
+      <p:transition spd="med" p14:dur="700">
+        <p:fade/>
+      </p:transition>
+    </mc:Choice>
+    <mc:Fallback>
+      <p:transition spd="med">
+        <p:fade/>
+      </p:transition>
+    </mc:Fallback>
+  </mc:AlternateContent>
+</p:sld>
+</file>
+
+<file path=ppt/slides/slide17.xml><?xml version="1.0" encoding="utf-8"?>
+<p:sld xmlns:a="http://schemas.openxmlformats.org/drawingml/2006/main" xmlns:r="http://schemas.openxmlformats.org/officeDocument/2006/relationships" xmlns:p="http://schemas.openxmlformats.org/presentationml/2006/main" showMasterSp="0">
+  <p:cSld>
+    <p:spTree>
+      <p:nvGrpSpPr>
+        <p:cNvPr id="1" name="">
+          <a:extLst>
+            <a:ext uri="{FF2B5EF4-FFF2-40B4-BE49-F238E27FC236}">
+              <a16:creationId xmlns:a16="http://schemas.microsoft.com/office/drawing/2014/main" id="{5053BC6D-F373-CF97-8F63-BB65EA7BD9AF}"/>
+            </a:ext>
+          </a:extLst>
+        </p:cNvPr>
+        <p:cNvGrpSpPr/>
+        <p:nvPr/>
+      </p:nvGrpSpPr>
+      <p:grpSpPr>
+        <a:xfrm>
+          <a:off x="0" y="0"/>
+          <a:ext cx="0" cy="0"/>
+          <a:chOff x="0" y="0"/>
+          <a:chExt cx="0" cy="0"/>
+        </a:xfrm>
+      </p:grpSpPr>
+      <p:sp>
+        <p:nvSpPr>
+          <p:cNvPr id="1640" name="PESTLE Analysis">
+            <a:extLst>
+              <a:ext uri="{FF2B5EF4-FFF2-40B4-BE49-F238E27FC236}">
+                <a16:creationId xmlns:a16="http://schemas.microsoft.com/office/drawing/2014/main" id="{B902BFE7-D907-2938-BEE8-C834294CD9D8}"/>
+              </a:ext>
+            </a:extLst>
+          </p:cNvPr>
+          <p:cNvSpPr txBox="1"/>
+          <p:nvPr/>
+        </p:nvSpPr>
+        <p:spPr>
+          <a:xfrm>
+            <a:off x="9858131" y="177666"/>
+            <a:ext cx="4606252" cy="1333700"/>
+          </a:xfrm>
+          <a:prstGeom prst="rect">
+            <a:avLst/>
+          </a:prstGeom>
+          <a:ln w="12700">
+            <a:solidFill>
+              <a:schemeClr val="tx1"/>
+            </a:solidFill>
+            <a:miter lim="400000"/>
+          </a:ln>
+          <a:extLst>
+            <a:ext uri="{C572A759-6A51-4108-AA02-DFA0A04FC94B}">
+              <ma14:wrappingTextBoxFlag xmlns:ma14="http://schemas.microsoft.com/office/mac/drawingml/2011/main" xmlns:a14="http://schemas.microsoft.com/office/drawing/2010/main" xmlns:m="http://schemas.openxmlformats.org/officeDocument/2006/math" xmlns="" val="1"/>
+            </a:ext>
+          </a:extLst>
+        </p:spPr>
+        <p:txBody>
+          <a:bodyPr wrap="square" lIns="50801" tIns="50801" rIns="50801" bIns="50801">
+            <a:spAutoFit/>
+          </a:bodyPr>
+          <a:lstStyle>
+            <a:lvl1pPr algn="l">
+              <a:defRPr sz="8000" b="0">
+                <a:solidFill>
+                  <a:srgbClr val="242423"/>
+                </a:solidFill>
+                <a:latin typeface="Montserrat Bold"/>
+                <a:ea typeface="Montserrat Bold"/>
+                <a:cs typeface="Montserrat Bold"/>
+                <a:sym typeface="Montserrat Bold"/>
+              </a:defRPr>
+            </a:lvl1pPr>
+          </a:lstStyle>
+          <a:p>
+            <a:r>
+              <a:rPr lang="ru-RU" b="1" dirty="0">
+                <a:solidFill>
+                  <a:schemeClr val="tx1"/>
+                </a:solidFill>
+                <a:latin typeface="Arial" panose="020B0604020202020204" pitchFamily="34" charset="0"/>
+                <a:cs typeface="Arial" panose="020B0604020202020204" pitchFamily="34" charset="0"/>
+              </a:rPr>
+              <a:t>Корзина</a:t>
+            </a:r>
+            <a:endParaRPr b="1" dirty="0">
+              <a:solidFill>
+                <a:schemeClr val="tx1"/>
+              </a:solidFill>
+              <a:latin typeface="Arial" panose="020B0604020202020204" pitchFamily="34" charset="0"/>
+              <a:cs typeface="Arial" panose="020B0604020202020204" pitchFamily="34" charset="0"/>
+            </a:endParaRPr>
+          </a:p>
+        </p:txBody>
+      </p:sp>
+      <p:pic>
+        <p:nvPicPr>
+          <p:cNvPr id="4" name="Рисунок 3">
+            <a:extLst>
+              <a:ext uri="{FF2B5EF4-FFF2-40B4-BE49-F238E27FC236}">
+                <a16:creationId xmlns:a16="http://schemas.microsoft.com/office/drawing/2014/main" id="{4A3D36BA-B05C-16C4-668E-AF68B9F7A898}"/>
+              </a:ext>
+            </a:extLst>
+          </p:cNvPr>
+          <p:cNvPicPr>
+            <a:picLocks noChangeAspect="1"/>
+          </p:cNvPicPr>
+          <p:nvPr/>
+        </p:nvPicPr>
+        <p:blipFill>
+          <a:blip r:embed="rId2"/>
+          <a:stretch>
+            <a:fillRect/>
+          </a:stretch>
+        </p:blipFill>
+        <p:spPr>
+          <a:xfrm>
+            <a:off x="86602" y="1818572"/>
+            <a:ext cx="24297398" cy="6822358"/>
+          </a:xfrm>
+          <a:prstGeom prst="rect">
+            <a:avLst/>
+          </a:prstGeom>
+        </p:spPr>
+      </p:pic>
+    </p:spTree>
+    <p:extLst>
+      <p:ext uri="{BB962C8B-B14F-4D97-AF65-F5344CB8AC3E}">
+        <p14:creationId xmlns:p14="http://schemas.microsoft.com/office/powerpoint/2010/main" val="3728831776"/>
+      </p:ext>
+    </p:extLst>
+  </p:cSld>
+  <p:clrMapOvr>
+    <a:masterClrMapping/>
+  </p:clrMapOvr>
+  <mc:AlternateContent xmlns:mc="http://schemas.openxmlformats.org/markup-compatibility/2006">
+    <mc:Choice xmlns:p14="http://schemas.microsoft.com/office/powerpoint/2010/main" Requires="p14">
+      <p:transition spd="med" p14:dur="700">
+        <p:fade/>
+      </p:transition>
+    </mc:Choice>
+    <mc:Fallback>
+      <p:transition spd="med">
+        <p:fade/>
+      </p:transition>
+    </mc:Fallback>
+  </mc:AlternateContent>
+</p:sld>
+</file>
+
+<file path=ppt/slides/slide18.xml><?xml version="1.0" encoding="utf-8"?>
+<p:sld xmlns:a="http://schemas.openxmlformats.org/drawingml/2006/main" xmlns:r="http://schemas.openxmlformats.org/officeDocument/2006/relationships" xmlns:p="http://schemas.openxmlformats.org/presentationml/2006/main" showMasterSp="0">
+  <p:cSld>
+    <p:spTree>
+      <p:nvGrpSpPr>
+        <p:cNvPr id="1" name="">
+          <a:extLst>
+            <a:ext uri="{FF2B5EF4-FFF2-40B4-BE49-F238E27FC236}">
+              <a16:creationId xmlns:a16="http://schemas.microsoft.com/office/drawing/2014/main" id="{D49FD90D-D978-D1E5-8F08-3B4687B2C87D}"/>
+            </a:ext>
+          </a:extLst>
+        </p:cNvPr>
+        <p:cNvGrpSpPr/>
+        <p:nvPr/>
+      </p:nvGrpSpPr>
+      <p:grpSpPr>
+        <a:xfrm>
+          <a:off x="0" y="0"/>
+          <a:ext cx="0" cy="0"/>
+          <a:chOff x="0" y="0"/>
+          <a:chExt cx="0" cy="0"/>
+        </a:xfrm>
+      </p:grpSpPr>
+      <p:sp>
+        <p:nvSpPr>
+          <p:cNvPr id="1640" name="PESTLE Analysis">
+            <a:extLst>
+              <a:ext uri="{FF2B5EF4-FFF2-40B4-BE49-F238E27FC236}">
+                <a16:creationId xmlns:a16="http://schemas.microsoft.com/office/drawing/2014/main" id="{8E730BAF-1175-365B-80CD-29616B22835F}"/>
+              </a:ext>
+            </a:extLst>
+          </p:cNvPr>
+          <p:cNvSpPr txBox="1"/>
+          <p:nvPr/>
+        </p:nvSpPr>
+        <p:spPr>
+          <a:xfrm>
+            <a:off x="2330823" y="177666"/>
+            <a:ext cx="19722353" cy="2564807"/>
+          </a:xfrm>
+          <a:prstGeom prst="rect">
+            <a:avLst/>
+          </a:prstGeom>
+          <a:ln w="12700">
+            <a:solidFill>
+              <a:schemeClr val="tx1"/>
+            </a:solidFill>
+            <a:miter lim="400000"/>
+          </a:ln>
+          <a:extLst>
+            <a:ext uri="{C572A759-6A51-4108-AA02-DFA0A04FC94B}">
+              <ma14:wrappingTextBoxFlag xmlns="" xmlns:m="http://schemas.openxmlformats.org/officeDocument/2006/math" xmlns:a14="http://schemas.microsoft.com/office/drawing/2010/main" xmlns:ma14="http://schemas.microsoft.com/office/mac/drawingml/2011/main" val="1"/>
+            </a:ext>
+          </a:extLst>
+        </p:spPr>
+        <p:txBody>
+          <a:bodyPr wrap="square" lIns="50801" tIns="50801" rIns="50801" bIns="50801">
+            <a:spAutoFit/>
+          </a:bodyPr>
+          <a:lstStyle>
+            <a:lvl1pPr algn="l">
+              <a:defRPr sz="8000" b="0">
+                <a:solidFill>
+                  <a:srgbClr val="242423"/>
+                </a:solidFill>
+                <a:latin typeface="Montserrat Bold"/>
+                <a:ea typeface="Montserrat Bold"/>
+                <a:cs typeface="Montserrat Bold"/>
+                <a:sym typeface="Montserrat Bold"/>
+              </a:defRPr>
+            </a:lvl1pPr>
+          </a:lstStyle>
+          <a:p>
+            <a:pPr algn="ctr"/>
+            <a:r>
+              <a:rPr lang="ru-RU" b="1" dirty="0">
+                <a:solidFill>
+                  <a:schemeClr val="tx1"/>
+                </a:solidFill>
+                <a:latin typeface="Arial" panose="020B0604020202020204" pitchFamily="34" charset="0"/>
+                <a:cs typeface="Arial" panose="020B0604020202020204" pitchFamily="34" charset="0"/>
+              </a:rPr>
+              <a:t>Страница выдачи зарезервированной продажи</a:t>
+            </a:r>
+            <a:endParaRPr b="1" dirty="0">
+              <a:solidFill>
+                <a:schemeClr val="tx1"/>
+              </a:solidFill>
+              <a:latin typeface="Arial" panose="020B0604020202020204" pitchFamily="34" charset="0"/>
+              <a:cs typeface="Arial" panose="020B0604020202020204" pitchFamily="34" charset="0"/>
+            </a:endParaRPr>
+          </a:p>
+        </p:txBody>
+      </p:sp>
+      <p:pic>
+        <p:nvPicPr>
+          <p:cNvPr id="8" name="Рисунок 7">
+            <a:extLst>
+              <a:ext uri="{FF2B5EF4-FFF2-40B4-BE49-F238E27FC236}">
+                <a16:creationId xmlns:a16="http://schemas.microsoft.com/office/drawing/2014/main" id="{365621AF-CE62-1357-D6CC-10FCC88DECF6}"/>
+              </a:ext>
+            </a:extLst>
+          </p:cNvPr>
+          <p:cNvPicPr>
+            <a:picLocks noChangeAspect="1"/>
+          </p:cNvPicPr>
+          <p:nvPr/>
+        </p:nvPicPr>
+        <p:blipFill>
+          <a:blip r:embed="rId2"/>
+          <a:stretch>
+            <a:fillRect/>
+          </a:stretch>
+        </p:blipFill>
+        <p:spPr>
+          <a:xfrm>
+            <a:off x="0" y="3112303"/>
+            <a:ext cx="23893837" cy="7896356"/>
+          </a:xfrm>
+          <a:prstGeom prst="rect">
+            <a:avLst/>
+          </a:prstGeom>
+        </p:spPr>
+      </p:pic>
+    </p:spTree>
+    <p:extLst>
+      <p:ext uri="{BB962C8B-B14F-4D97-AF65-F5344CB8AC3E}">
+        <p14:creationId xmlns:p14="http://schemas.microsoft.com/office/powerpoint/2010/main" val="2831556889"/>
+      </p:ext>
+    </p:extLst>
+  </p:cSld>
+  <p:clrMapOvr>
+    <a:masterClrMapping/>
+  </p:clrMapOvr>
+  <mc:AlternateContent xmlns:mc="http://schemas.openxmlformats.org/markup-compatibility/2006">
+    <mc:Choice xmlns:p14="http://schemas.microsoft.com/office/powerpoint/2010/main" Requires="p14">
+      <p:transition spd="med" p14:dur="700">
+        <p:fade/>
+      </p:transition>
+    </mc:Choice>
+    <mc:Fallback>
+      <p:transition spd="med">
+        <p:fade/>
+      </p:transition>
+    </mc:Fallback>
+  </mc:AlternateContent>
+</p:sld>
+</file>
+
+<file path=ppt/slides/slide19.xml><?xml version="1.0" encoding="utf-8"?>
+<p:sld xmlns:a="http://schemas.openxmlformats.org/drawingml/2006/main" xmlns:r="http://schemas.openxmlformats.org/officeDocument/2006/relationships" xmlns:p="http://schemas.openxmlformats.org/presentationml/2006/main" showMasterSp="0">
+  <p:cSld>
+    <p:spTree>
+      <p:nvGrpSpPr>
+        <p:cNvPr id="1" name="">
+          <a:extLst>
+            <a:ext uri="{FF2B5EF4-FFF2-40B4-BE49-F238E27FC236}">
+              <a16:creationId xmlns:a16="http://schemas.microsoft.com/office/drawing/2014/main" id="{9AFDA768-6922-44F2-8C2A-5A33041AF8EA}"/>
+            </a:ext>
+          </a:extLst>
+        </p:cNvPr>
+        <p:cNvGrpSpPr/>
+        <p:nvPr/>
+      </p:nvGrpSpPr>
+      <p:grpSpPr>
+        <a:xfrm>
+          <a:off x="0" y="0"/>
+          <a:ext cx="0" cy="0"/>
+          <a:chOff x="0" y="0"/>
+          <a:chExt cx="0" cy="0"/>
+        </a:xfrm>
+      </p:grpSpPr>
+      <p:sp>
+        <p:nvSpPr>
+          <p:cNvPr id="1640" name="PESTLE Analysis">
+            <a:extLst>
+              <a:ext uri="{FF2B5EF4-FFF2-40B4-BE49-F238E27FC236}">
+                <a16:creationId xmlns:a16="http://schemas.microsoft.com/office/drawing/2014/main" id="{CBB385F5-396D-D857-E293-4ECD2EF2EB2A}"/>
+              </a:ext>
+            </a:extLst>
+          </p:cNvPr>
+          <p:cNvSpPr txBox="1"/>
+          <p:nvPr/>
+        </p:nvSpPr>
+        <p:spPr>
+          <a:xfrm>
+            <a:off x="2330823" y="177666"/>
+            <a:ext cx="19722353" cy="1333700"/>
+          </a:xfrm>
+          <a:prstGeom prst="rect">
+            <a:avLst/>
+          </a:prstGeom>
+          <a:ln w="12700">
+            <a:solidFill>
+              <a:schemeClr val="tx1"/>
+            </a:solidFill>
+            <a:miter lim="400000"/>
+          </a:ln>
+          <a:extLst>
+            <a:ext uri="{C572A759-6A51-4108-AA02-DFA0A04FC94B}">
+              <ma14:wrappingTextBoxFlag xmlns:ma14="http://schemas.microsoft.com/office/mac/drawingml/2011/main" xmlns:a14="http://schemas.microsoft.com/office/drawing/2010/main" xmlns:m="http://schemas.openxmlformats.org/officeDocument/2006/math" xmlns="" val="1"/>
+            </a:ext>
+          </a:extLst>
+        </p:spPr>
+        <p:txBody>
+          <a:bodyPr wrap="square" lIns="50801" tIns="50801" rIns="50801" bIns="50801">
+            <a:spAutoFit/>
+          </a:bodyPr>
+          <a:lstStyle>
+            <a:lvl1pPr algn="l">
+              <a:defRPr sz="8000" b="0">
+                <a:solidFill>
+                  <a:srgbClr val="242423"/>
+                </a:solidFill>
+                <a:latin typeface="Montserrat Bold"/>
+                <a:ea typeface="Montserrat Bold"/>
+                <a:cs typeface="Montserrat Bold"/>
+                <a:sym typeface="Montserrat Bold"/>
+              </a:defRPr>
+            </a:lvl1pPr>
+          </a:lstStyle>
+          <a:p>
+            <a:pPr algn="ctr"/>
+            <a:r>
+              <a:rPr lang="ru-RU" b="1" dirty="0">
+                <a:solidFill>
+                  <a:schemeClr val="tx1"/>
+                </a:solidFill>
+                <a:latin typeface="Arial" panose="020B0604020202020204" pitchFamily="34" charset="0"/>
+                <a:cs typeface="Arial" panose="020B0604020202020204" pitchFamily="34" charset="0"/>
+              </a:rPr>
+              <a:t>Добавление товара</a:t>
+            </a:r>
+            <a:r>
+              <a:rPr lang="en-US" b="1" dirty="0">
+                <a:solidFill>
+                  <a:schemeClr val="tx1"/>
+                </a:solidFill>
+                <a:latin typeface="Arial" panose="020B0604020202020204" pitchFamily="34" charset="0"/>
+                <a:cs typeface="Arial" panose="020B0604020202020204" pitchFamily="34" charset="0"/>
+              </a:rPr>
+              <a:t> </a:t>
+            </a:r>
+            <a:r>
+              <a:rPr lang="ru-RU" b="1" dirty="0">
+                <a:solidFill>
+                  <a:schemeClr val="tx1"/>
+                </a:solidFill>
+                <a:latin typeface="Arial" panose="020B0604020202020204" pitchFamily="34" charset="0"/>
+                <a:cs typeface="Arial" panose="020B0604020202020204" pitchFamily="34" charset="0"/>
+              </a:rPr>
+              <a:t>в ИС</a:t>
+            </a:r>
+            <a:endParaRPr b="1" dirty="0">
+              <a:solidFill>
+                <a:schemeClr val="tx1"/>
+              </a:solidFill>
+              <a:latin typeface="Arial" panose="020B0604020202020204" pitchFamily="34" charset="0"/>
+              <a:cs typeface="Arial" panose="020B0604020202020204" pitchFamily="34" charset="0"/>
+            </a:endParaRPr>
+          </a:p>
+        </p:txBody>
+      </p:sp>
+      <p:pic>
+        <p:nvPicPr>
+          <p:cNvPr id="3" name="Рисунок 2">
+            <a:extLst>
+              <a:ext uri="{FF2B5EF4-FFF2-40B4-BE49-F238E27FC236}">
+                <a16:creationId xmlns:a16="http://schemas.microsoft.com/office/drawing/2014/main" id="{B0ADA4E4-13CE-E32C-27A5-753D9DCC46ED}"/>
+              </a:ext>
+            </a:extLst>
+          </p:cNvPr>
+          <p:cNvPicPr>
+            <a:picLocks noChangeAspect="1"/>
+          </p:cNvPicPr>
+          <p:nvPr/>
+        </p:nvPicPr>
+        <p:blipFill>
+          <a:blip r:embed="rId2"/>
+          <a:stretch>
+            <a:fillRect/>
+          </a:stretch>
+        </p:blipFill>
+        <p:spPr>
+          <a:xfrm>
+            <a:off x="0" y="1740195"/>
+            <a:ext cx="24384000" cy="11975806"/>
+          </a:xfrm>
+          <a:prstGeom prst="rect">
+            <a:avLst/>
+          </a:prstGeom>
+        </p:spPr>
+      </p:pic>
+    </p:spTree>
+    <p:extLst>
+      <p:ext uri="{BB962C8B-B14F-4D97-AF65-F5344CB8AC3E}">
+        <p14:creationId xmlns:p14="http://schemas.microsoft.com/office/powerpoint/2010/main" val="3128995616"/>
+      </p:ext>
+    </p:extLst>
+  </p:cSld>
+  <p:clrMapOvr>
+    <a:masterClrMapping/>
+  </p:clrMapOvr>
+  <mc:AlternateContent xmlns:mc="http://schemas.openxmlformats.org/markup-compatibility/2006">
+    <mc:Choice xmlns:p14="http://schemas.microsoft.com/office/powerpoint/2010/main" Requires="p14">
+      <p:transition spd="med" p14:dur="700">
+        <p:fade/>
+      </p:transition>
+    </mc:Choice>
+    <mc:Fallback>
+      <p:transition spd="med">
+        <p:fade/>
+      </p:transition>
+    </mc:Fallback>
+  </mc:AlternateContent>
+</p:sld>
+</file>
+
+<file path=ppt/slides/slide2.xml><?xml version="1.0" encoding="utf-8"?>
+<p:sld xmlns:a="http://schemas.openxmlformats.org/drawingml/2006/main" xmlns:r="http://schemas.openxmlformats.org/officeDocument/2006/relationships" xmlns:p="http://schemas.openxmlformats.org/presentationml/2006/main">
+  <p:cSld>
+    <p:spTree>
+      <p:nvGrpSpPr>
+        <p:cNvPr id="1" name=""/>
+        <p:cNvGrpSpPr/>
+        <p:nvPr/>
+      </p:nvGrpSpPr>
+      <p:grpSpPr>
+        <a:xfrm>
+          <a:off x="0" y="0"/>
+          <a:ext cx="0" cy="0"/>
+          <a:chOff x="0" y="0"/>
+          <a:chExt cx="0" cy="0"/>
+        </a:xfrm>
+      </p:grpSpPr>
+      <p:sp>
+        <p:nvSpPr>
+          <p:cNvPr id="61" name="Subtitle Text"/>
+          <p:cNvSpPr/>
+          <p:nvPr/>
+        </p:nvSpPr>
+        <p:spPr>
+          <a:xfrm>
+            <a:off x="1427164" y="2266950"/>
+            <a:ext cx="3322710" cy="337530"/>
+          </a:xfrm>
+          <a:custGeom>
+            <a:avLst/>
+            <a:gdLst/>
+            <a:ahLst/>
+            <a:cxnLst>
+              <a:cxn ang="0">
+                <a:pos x="wd2" y="hd2"/>
+              </a:cxn>
+              <a:cxn ang="5400000">
+                <a:pos x="wd2" y="hd2"/>
+              </a:cxn>
+              <a:cxn ang="10800000">
+                <a:pos x="wd2" y="hd2"/>
+              </a:cxn>
+              <a:cxn ang="16200000">
+                <a:pos x="wd2" y="hd2"/>
+              </a:cxn>
+            </a:cxnLst>
+            <a:rect l="0" t="0" r="r" b="b"/>
+            <a:pathLst>
+              <a:path w="21600" extrusionOk="0">
+                <a:moveTo>
+                  <a:pt x="0" y="0"/>
+                </a:moveTo>
+                <a:lnTo>
+                  <a:pt x="21600" y="0"/>
+                </a:lnTo>
+                <a:lnTo>
+                  <a:pt x="21600" y="0"/>
+                </a:lnTo>
+                <a:lnTo>
+                  <a:pt x="0" y="0"/>
+                </a:lnTo>
+                <a:close/>
+              </a:path>
+            </a:pathLst>
+          </a:custGeom>
+          <a:noFill/>
+          <a:ln w="12700" cap="flat">
+            <a:noFill/>
+            <a:miter lim="400000"/>
+          </a:ln>
+          <a:effectLst/>
+          <a:extLst>
+            <a:ext uri="{C572A759-6A51-4108-AA02-DFA0A04FC94B}">
+              <ma14:wrappingTextBoxFlag xmlns="" xmlns:m="http://schemas.openxmlformats.org/officeDocument/2006/math" xmlns:a14="http://schemas.microsoft.com/office/drawing/2010/main" xmlns:ma14="http://schemas.microsoft.com/office/mac/drawingml/2011/main" val="1"/>
+            </a:ext>
+          </a:extLst>
+        </p:spPr>
+        <p:txBody>
+          <a:bodyPr wrap="square" lIns="50801" tIns="50801" rIns="50801" bIns="50801" numCol="1" anchor="t">
+            <a:spAutoFit/>
+          </a:bodyPr>
+          <a:lstStyle>
+            <a:lvl1pPr algn="l" defTabSz="457200">
+              <a:lnSpc>
+                <a:spcPct val="120000"/>
+              </a:lnSpc>
+              <a:defRPr sz="1400" cap="all" spc="1120">
+                <a:solidFill>
+                  <a:srgbClr val="242423"/>
+                </a:solidFill>
+                <a:latin typeface="Arial"/>
+                <a:ea typeface="Arial"/>
+                <a:cs typeface="Arial"/>
+                <a:sym typeface="Arial"/>
+              </a:defRPr>
+            </a:lvl1pPr>
+          </a:lstStyle>
+          <a:p>
+            <a:r>
+              <a:rPr sz="1401" dirty="0">
+                <a:solidFill>
+                  <a:schemeClr val="tx1"/>
+                </a:solidFill>
+                <a:latin typeface="Arial" panose="020B0604020202020204" pitchFamily="34" charset="0"/>
+                <a:cs typeface="Arial" panose="020B0604020202020204" pitchFamily="34" charset="0"/>
+              </a:rPr>
+              <a:t> </a:t>
+            </a:r>
+          </a:p>
+        </p:txBody>
+      </p:sp>
+      <p:sp>
+        <p:nvSpPr>
+          <p:cNvPr id="2" name="TextBox 1">
+            <a:extLst>
+              <a:ext uri="{FF2B5EF4-FFF2-40B4-BE49-F238E27FC236}">
+                <a16:creationId xmlns:a16="http://schemas.microsoft.com/office/drawing/2014/main" id="{1AB53D68-F6BD-D3C6-A1A4-28D1B34FF467}"/>
+              </a:ext>
+            </a:extLst>
+          </p:cNvPr>
+          <p:cNvSpPr txBox="1"/>
+          <p:nvPr/>
+        </p:nvSpPr>
+        <p:spPr>
+          <a:xfrm>
+            <a:off x="1586227" y="2803553"/>
+            <a:ext cx="17005204" cy="1067825"/>
+          </a:xfrm>
+          <a:prstGeom prst="rect">
+            <a:avLst/>
+          </a:prstGeom>
+          <a:gradFill>
+            <a:gsLst>
+              <a:gs pos="1000">
+                <a:srgbClr val="C80D3F"/>
+              </a:gs>
+              <a:gs pos="20000">
+                <a:srgbClr val="DF2935"/>
+              </a:gs>
+              <a:gs pos="43000">
+                <a:srgbClr val="FF5E62"/>
+              </a:gs>
+            </a:gsLst>
+            <a:lin ang="0" scaled="0"/>
+          </a:gradFill>
+        </p:spPr>
+        <p:txBody>
+          <a:bodyPr wrap="square" rtlCol="0" anchor="ctr" anchorCtr="0">
+            <a:noAutofit/>
+          </a:bodyPr>
+          <a:lstStyle/>
+          <a:p>
+            <a:pPr algn="ctr"/>
+            <a:r>
+              <a:rPr lang="ru-RU" sz="5644" spc="188" dirty="0">
+                <a:solidFill>
+                  <a:schemeClr val="bg1"/>
+                </a:solidFill>
+                <a:latin typeface="+mj-lt"/>
+              </a:rPr>
+              <a:t>Актуальность темы исследования</a:t>
+            </a:r>
+          </a:p>
+        </p:txBody>
+      </p:sp>
+      <p:sp>
+        <p:nvSpPr>
+          <p:cNvPr id="3" name="TextBox 2">
+            <a:extLst>
+              <a:ext uri="{FF2B5EF4-FFF2-40B4-BE49-F238E27FC236}">
+                <a16:creationId xmlns:a16="http://schemas.microsoft.com/office/drawing/2014/main" id="{3BAB6FB0-34DD-8BCF-2FFC-88EF2AAB1730}"/>
+              </a:ext>
+            </a:extLst>
+          </p:cNvPr>
+          <p:cNvSpPr txBox="1"/>
+          <p:nvPr/>
+        </p:nvSpPr>
+        <p:spPr>
+          <a:xfrm>
+            <a:off x="2273963" y="4358490"/>
+            <a:ext cx="16285312" cy="4963309"/>
+          </a:xfrm>
+          <a:prstGeom prst="rect">
+            <a:avLst/>
+          </a:prstGeom>
+          <a:noFill/>
+        </p:spPr>
+        <p:txBody>
+          <a:bodyPr wrap="square" lIns="0" tIns="0" rIns="0" bIns="0" rtlCol="0">
+            <a:noAutofit/>
+          </a:bodyPr>
+          <a:lstStyle/>
+          <a:p>
+            <a:pPr algn="just">
+              <a:spcAft>
+                <a:spcPts val="3387"/>
+              </a:spcAft>
+            </a:pPr>
+            <a:r>
+              <a:rPr lang="ru-RU" sz="4000" dirty="0">
+                <a:latin typeface="+mn-lt"/>
+              </a:rPr>
+              <a:t>Актуальность обосновывается тем, что в современном мире одна часть работы – автоматизирована, а другая – нет. Соответственно, для улучшения качества жизни людей необходимо внедрять автоматизацию везде, где это возможно, включая продажи музыкального оборудования.</a:t>
+            </a:r>
+            <a:endParaRPr lang="ru-RU" sz="5644" dirty="0">
+              <a:latin typeface="+mn-lt"/>
+            </a:endParaRPr>
+          </a:p>
+        </p:txBody>
+      </p:sp>
+      <p:sp>
+        <p:nvSpPr>
+          <p:cNvPr id="4" name="Oval 10">
+            <a:extLst>
+              <a:ext uri="{FF2B5EF4-FFF2-40B4-BE49-F238E27FC236}">
+                <a16:creationId xmlns:a16="http://schemas.microsoft.com/office/drawing/2014/main" id="{79BA2B61-3572-37A6-E552-50201A3E9DE6}"/>
+              </a:ext>
+            </a:extLst>
+          </p:cNvPr>
+          <p:cNvSpPr/>
+          <p:nvPr/>
+        </p:nvSpPr>
+        <p:spPr>
+          <a:xfrm>
+            <a:off x="1569767" y="4414335"/>
+            <a:ext cx="325111" cy="325111"/>
+          </a:xfrm>
+          <a:prstGeom prst="ellipse">
+            <a:avLst/>
+          </a:prstGeom>
+          <a:solidFill>
+            <a:schemeClr val="accent1"/>
+          </a:solidFill>
+          <a:ln>
+            <a:noFill/>
+          </a:ln>
+        </p:spPr>
+        <p:style>
+          <a:lnRef idx="2">
+            <a:schemeClr val="accent1">
+              <a:shade val="50000"/>
+            </a:schemeClr>
+          </a:lnRef>
+          <a:fillRef idx="1">
+            <a:schemeClr val="accent1"/>
+          </a:fillRef>
+          <a:effectRef idx="0">
+            <a:schemeClr val="accent1"/>
+          </a:effectRef>
+          <a:fontRef idx="minor">
+            <a:schemeClr val="lt1"/>
+          </a:fontRef>
+        </p:style>
+        <p:txBody>
+          <a:bodyPr rtlCol="0" anchor="ctr"/>
+          <a:lstStyle/>
+          <a:p>
+            <a:pPr algn="ctr"/>
+            <a:endParaRPr lang="ru-RU" sz="5644"/>
+          </a:p>
+        </p:txBody>
+      </p:sp>
+      <p:cxnSp>
+        <p:nvCxnSpPr>
+          <p:cNvPr id="7" name="Straight Connector 14">
+            <a:extLst>
+              <a:ext uri="{FF2B5EF4-FFF2-40B4-BE49-F238E27FC236}">
+                <a16:creationId xmlns:a16="http://schemas.microsoft.com/office/drawing/2014/main" id="{8969CC08-750C-30A1-06CD-244017F1488D}"/>
+              </a:ext>
+            </a:extLst>
+          </p:cNvPr>
+          <p:cNvCxnSpPr>
+            <a:cxnSpLocks/>
+          </p:cNvCxnSpPr>
+          <p:nvPr/>
+        </p:nvCxnSpPr>
+        <p:spPr>
+          <a:xfrm>
+            <a:off x="1732326" y="4868435"/>
+            <a:ext cx="0" cy="2536412"/>
+          </a:xfrm>
+          <a:prstGeom prst="line">
+            <a:avLst/>
+          </a:prstGeom>
+          <a:ln w="12700">
+            <a:solidFill>
+              <a:srgbClr val="A30236"/>
+            </a:solidFill>
+          </a:ln>
+        </p:spPr>
+        <p:style>
+          <a:lnRef idx="1">
+            <a:schemeClr val="accent1"/>
+          </a:lnRef>
+          <a:fillRef idx="0">
+            <a:schemeClr val="accent1"/>
+          </a:fillRef>
+          <a:effectRef idx="0">
+            <a:schemeClr val="accent1"/>
+          </a:effectRef>
+          <a:fontRef idx="minor">
+            <a:schemeClr val="tx1"/>
+          </a:fontRef>
+        </p:style>
+      </p:cxnSp>
+    </p:spTree>
+  </p:cSld>
+  <p:clrMapOvr>
+    <a:masterClrMapping/>
+  </p:clrMapOvr>
+  <mc:AlternateContent xmlns:mc="http://schemas.openxmlformats.org/markup-compatibility/2006" xmlns:p14="http://schemas.microsoft.com/office/powerpoint/2010/main">
+    <mc:Choice Requires="p14">
+      <p:transition spd="med" p14:dur="700">
+        <p:fade/>
+      </p:transition>
+    </mc:Choice>
+    <mc:Fallback xmlns="">
+      <p:transition spd="med">
+        <p:fade/>
+      </p:transition>
+    </mc:Fallback>
+  </mc:AlternateContent>
+</p:sld>
+</file>
+
+<file path=ppt/slides/slide20.xml><?xml version="1.0" encoding="utf-8"?>
+<p:sld xmlns:a="http://schemas.openxmlformats.org/drawingml/2006/main" xmlns:r="http://schemas.openxmlformats.org/officeDocument/2006/relationships" xmlns:p="http://schemas.openxmlformats.org/presentationml/2006/main" showMasterSp="0">
+  <p:cSld>
+    <p:spTree>
+      <p:nvGrpSpPr>
+        <p:cNvPr id="1" name="">
+          <a:extLst>
+            <a:ext uri="{FF2B5EF4-FFF2-40B4-BE49-F238E27FC236}">
+              <a16:creationId xmlns:a16="http://schemas.microsoft.com/office/drawing/2014/main" id="{0B692FF4-A0C5-D0C6-02CE-E9CCE66D49B2}"/>
+            </a:ext>
+          </a:extLst>
+        </p:cNvPr>
+        <p:cNvGrpSpPr/>
+        <p:nvPr/>
+      </p:nvGrpSpPr>
+      <p:grpSpPr>
+        <a:xfrm>
+          <a:off x="0" y="0"/>
+          <a:ext cx="0" cy="0"/>
+          <a:chOff x="0" y="0"/>
+          <a:chExt cx="0" cy="0"/>
+        </a:xfrm>
+      </p:grpSpPr>
+      <p:sp>
+        <p:nvSpPr>
+          <p:cNvPr id="1640" name="PESTLE Analysis">
+            <a:extLst>
+              <a:ext uri="{FF2B5EF4-FFF2-40B4-BE49-F238E27FC236}">
+                <a16:creationId xmlns:a16="http://schemas.microsoft.com/office/drawing/2014/main" id="{B7B2DFE5-9F9E-44DC-10D0-FC05B123133B}"/>
+              </a:ext>
+            </a:extLst>
+          </p:cNvPr>
+          <p:cNvSpPr txBox="1"/>
+          <p:nvPr/>
+        </p:nvSpPr>
+        <p:spPr>
+          <a:xfrm>
+            <a:off x="2330823" y="177666"/>
+            <a:ext cx="19722353" cy="1333700"/>
+          </a:xfrm>
+          <a:prstGeom prst="rect">
+            <a:avLst/>
+          </a:prstGeom>
+          <a:ln w="12700">
+            <a:solidFill>
+              <a:schemeClr val="tx1"/>
+            </a:solidFill>
+            <a:miter lim="400000"/>
+          </a:ln>
+          <a:extLst>
+            <a:ext uri="{C572A759-6A51-4108-AA02-DFA0A04FC94B}">
+              <ma14:wrappingTextBoxFlag xmlns="" xmlns:m="http://schemas.openxmlformats.org/officeDocument/2006/math" xmlns:a14="http://schemas.microsoft.com/office/drawing/2010/main" xmlns:ma14="http://schemas.microsoft.com/office/mac/drawingml/2011/main" val="1"/>
+            </a:ext>
+          </a:extLst>
+        </p:spPr>
+        <p:txBody>
+          <a:bodyPr wrap="square" lIns="50801" tIns="50801" rIns="50801" bIns="50801">
+            <a:spAutoFit/>
+          </a:bodyPr>
+          <a:lstStyle>
+            <a:lvl1pPr algn="l">
+              <a:defRPr sz="8000" b="0">
+                <a:solidFill>
+                  <a:srgbClr val="242423"/>
+                </a:solidFill>
+                <a:latin typeface="Montserrat Bold"/>
+                <a:ea typeface="Montserrat Bold"/>
+                <a:cs typeface="Montserrat Bold"/>
+                <a:sym typeface="Montserrat Bold"/>
+              </a:defRPr>
+            </a:lvl1pPr>
+          </a:lstStyle>
+          <a:p>
+            <a:pPr algn="ctr"/>
+            <a:r>
+              <a:rPr lang="ru-RU" b="1" dirty="0">
+                <a:solidFill>
+                  <a:schemeClr val="tx1"/>
+                </a:solidFill>
+                <a:latin typeface="Arial" panose="020B0604020202020204" pitchFamily="34" charset="0"/>
+                <a:cs typeface="Arial" panose="020B0604020202020204" pitchFamily="34" charset="0"/>
+              </a:rPr>
+              <a:t>Списковая страница поставок</a:t>
+            </a:r>
+            <a:endParaRPr b="1" dirty="0">
+              <a:solidFill>
+                <a:schemeClr val="tx1"/>
+              </a:solidFill>
+              <a:latin typeface="Arial" panose="020B0604020202020204" pitchFamily="34" charset="0"/>
+              <a:cs typeface="Arial" panose="020B0604020202020204" pitchFamily="34" charset="0"/>
+            </a:endParaRPr>
+          </a:p>
+        </p:txBody>
+      </p:sp>
+      <p:pic>
+        <p:nvPicPr>
+          <p:cNvPr id="4" name="Рисунок 3">
+            <a:extLst>
+              <a:ext uri="{FF2B5EF4-FFF2-40B4-BE49-F238E27FC236}">
+                <a16:creationId xmlns:a16="http://schemas.microsoft.com/office/drawing/2014/main" id="{0436FC75-3DD8-AE6E-8CC4-4B06EAA0DB83}"/>
+              </a:ext>
+            </a:extLst>
+          </p:cNvPr>
+          <p:cNvPicPr>
+            <a:picLocks noChangeAspect="1"/>
+          </p:cNvPicPr>
+          <p:nvPr/>
+        </p:nvPicPr>
+        <p:blipFill>
+          <a:blip r:embed="rId2"/>
+          <a:stretch>
+            <a:fillRect/>
+          </a:stretch>
+        </p:blipFill>
+        <p:spPr>
+          <a:xfrm>
+            <a:off x="0" y="2288041"/>
+            <a:ext cx="24307426" cy="9916593"/>
+          </a:xfrm>
+          <a:prstGeom prst="rect">
+            <a:avLst/>
+          </a:prstGeom>
+        </p:spPr>
+      </p:pic>
+    </p:spTree>
+    <p:extLst>
+      <p:ext uri="{BB962C8B-B14F-4D97-AF65-F5344CB8AC3E}">
+        <p14:creationId xmlns:p14="http://schemas.microsoft.com/office/powerpoint/2010/main" val="1895823768"/>
+      </p:ext>
+    </p:extLst>
+  </p:cSld>
+  <p:clrMapOvr>
+    <a:masterClrMapping/>
+  </p:clrMapOvr>
+  <mc:AlternateContent xmlns:mc="http://schemas.openxmlformats.org/markup-compatibility/2006">
+    <mc:Choice xmlns:p14="http://schemas.microsoft.com/office/powerpoint/2010/main" Requires="p14">
+      <p:transition spd="med" p14:dur="700">
+        <p:fade/>
+      </p:transition>
+    </mc:Choice>
+    <mc:Fallback>
+      <p:transition spd="med">
+        <p:fade/>
+      </p:transition>
+    </mc:Fallback>
+  </mc:AlternateContent>
+</p:sld>
+</file>
+
+<file path=ppt/slides/slide21.xml><?xml version="1.0" encoding="utf-8"?>
+<p:sld xmlns:a="http://schemas.openxmlformats.org/drawingml/2006/main" xmlns:r="http://schemas.openxmlformats.org/officeDocument/2006/relationships" xmlns:p="http://schemas.openxmlformats.org/presentationml/2006/main" showMasterSp="0">
+  <p:cSld>
+    <p:spTree>
+      <p:nvGrpSpPr>
+        <p:cNvPr id="1" name="">
+          <a:extLst>
+            <a:ext uri="{FF2B5EF4-FFF2-40B4-BE49-F238E27FC236}">
+              <a16:creationId xmlns:a16="http://schemas.microsoft.com/office/drawing/2014/main" id="{697BE73C-D3F3-E7A1-D231-08CFC21D9D25}"/>
+            </a:ext>
+          </a:extLst>
+        </p:cNvPr>
+        <p:cNvGrpSpPr/>
+        <p:nvPr/>
+      </p:nvGrpSpPr>
+      <p:grpSpPr>
+        <a:xfrm>
+          <a:off x="0" y="0"/>
+          <a:ext cx="0" cy="0"/>
+          <a:chOff x="0" y="0"/>
+          <a:chExt cx="0" cy="0"/>
+        </a:xfrm>
+      </p:grpSpPr>
+      <p:pic>
+        <p:nvPicPr>
+          <p:cNvPr id="3" name="Рисунок 2">
+            <a:extLst>
+              <a:ext uri="{FF2B5EF4-FFF2-40B4-BE49-F238E27FC236}">
+                <a16:creationId xmlns:a16="http://schemas.microsoft.com/office/drawing/2014/main" id="{0CAD34D3-50B9-E235-ACC0-1E6BA5C66899}"/>
+              </a:ext>
+            </a:extLst>
+          </p:cNvPr>
+          <p:cNvPicPr>
+            <a:picLocks noChangeAspect="1"/>
+          </p:cNvPicPr>
+          <p:nvPr/>
+        </p:nvPicPr>
+        <p:blipFill>
+          <a:blip r:embed="rId2"/>
+          <a:stretch>
+            <a:fillRect/>
+          </a:stretch>
+        </p:blipFill>
+        <p:spPr>
+          <a:xfrm>
+            <a:off x="0" y="732492"/>
+            <a:ext cx="24384000" cy="12983508"/>
+          </a:xfrm>
+          <a:prstGeom prst="rect">
+            <a:avLst/>
+          </a:prstGeom>
+        </p:spPr>
+      </p:pic>
+      <p:sp>
+        <p:nvSpPr>
+          <p:cNvPr id="1640" name="PESTLE Analysis">
+            <a:extLst>
+              <a:ext uri="{FF2B5EF4-FFF2-40B4-BE49-F238E27FC236}">
+                <a16:creationId xmlns:a16="http://schemas.microsoft.com/office/drawing/2014/main" id="{18D5A5DC-FDF2-44F7-F0EA-D4A6B8EE0029}"/>
+              </a:ext>
+            </a:extLst>
+          </p:cNvPr>
+          <p:cNvSpPr txBox="1"/>
+          <p:nvPr/>
+        </p:nvSpPr>
+        <p:spPr>
+          <a:xfrm>
+            <a:off x="8122023" y="0"/>
+            <a:ext cx="8139953" cy="1118257"/>
+          </a:xfrm>
+          <a:prstGeom prst="rect">
+            <a:avLst/>
+          </a:prstGeom>
+          <a:ln w="12700">
+            <a:solidFill>
+              <a:schemeClr val="tx1"/>
+            </a:solidFill>
+            <a:miter lim="400000"/>
+          </a:ln>
+          <a:extLst>
+            <a:ext uri="{C572A759-6A51-4108-AA02-DFA0A04FC94B}">
+              <ma14:wrappingTextBoxFlag xmlns:ma14="http://schemas.microsoft.com/office/mac/drawingml/2011/main" xmlns:a14="http://schemas.microsoft.com/office/drawing/2010/main" xmlns:m="http://schemas.openxmlformats.org/officeDocument/2006/math" xmlns="" val="1"/>
+            </a:ext>
+          </a:extLst>
+        </p:spPr>
+        <p:txBody>
+          <a:bodyPr wrap="square" lIns="50801" tIns="50801" rIns="50801" bIns="50801">
+            <a:spAutoFit/>
+          </a:bodyPr>
+          <a:lstStyle>
+            <a:lvl1pPr algn="l">
+              <a:defRPr sz="8000" b="0">
+                <a:solidFill>
+                  <a:srgbClr val="242423"/>
+                </a:solidFill>
+                <a:latin typeface="Montserrat Bold"/>
+                <a:ea typeface="Montserrat Bold"/>
+                <a:cs typeface="Montserrat Bold"/>
+                <a:sym typeface="Montserrat Bold"/>
+              </a:defRPr>
+            </a:lvl1pPr>
+          </a:lstStyle>
+          <a:p>
+            <a:pPr algn="ctr"/>
+            <a:r>
+              <a:rPr lang="ru-RU" sz="6600" b="1" dirty="0">
+                <a:solidFill>
+                  <a:schemeClr val="tx1"/>
+                </a:solidFill>
+                <a:latin typeface="Arial" panose="020B0604020202020204" pitchFamily="34" charset="0"/>
+                <a:cs typeface="Arial" panose="020B0604020202020204" pitchFamily="34" charset="0"/>
+              </a:rPr>
+              <a:t>Настройки отчета</a:t>
+            </a:r>
+            <a:endParaRPr sz="6600" b="1" dirty="0">
+              <a:solidFill>
+                <a:schemeClr val="tx1"/>
+              </a:solidFill>
+              <a:latin typeface="Arial" panose="020B0604020202020204" pitchFamily="34" charset="0"/>
+              <a:cs typeface="Arial" panose="020B0604020202020204" pitchFamily="34" charset="0"/>
+            </a:endParaRPr>
+          </a:p>
+        </p:txBody>
+      </p:sp>
+    </p:spTree>
+    <p:extLst>
+      <p:ext uri="{BB962C8B-B14F-4D97-AF65-F5344CB8AC3E}">
+        <p14:creationId xmlns:p14="http://schemas.microsoft.com/office/powerpoint/2010/main" val="1241194790"/>
+      </p:ext>
+    </p:extLst>
+  </p:cSld>
+  <p:clrMapOvr>
+    <a:masterClrMapping/>
+  </p:clrMapOvr>
+  <mc:AlternateContent xmlns:mc="http://schemas.openxmlformats.org/markup-compatibility/2006">
+    <mc:Choice xmlns:p14="http://schemas.microsoft.com/office/powerpoint/2010/main" Requires="p14">
+      <p:transition spd="med" p14:dur="700">
+        <p:fade/>
+      </p:transition>
+    </mc:Choice>
+    <mc:Fallback>
+      <p:transition spd="med">
+        <p:fade/>
+      </p:transition>
+    </mc:Fallback>
+  </mc:AlternateContent>
+</p:sld>
+</file>
+
+<file path=ppt/slides/slide22.xml><?xml version="1.0" encoding="utf-8"?>
+<p:sld xmlns:a="http://schemas.openxmlformats.org/drawingml/2006/main" xmlns:r="http://schemas.openxmlformats.org/officeDocument/2006/relationships" xmlns:p="http://schemas.openxmlformats.org/presentationml/2006/main" showMasterSp="0">
+  <p:cSld>
+    <p:spTree>
+      <p:nvGrpSpPr>
+        <p:cNvPr id="1" name="">
+          <a:extLst>
+            <a:ext uri="{FF2B5EF4-FFF2-40B4-BE49-F238E27FC236}">
+              <a16:creationId xmlns:a16="http://schemas.microsoft.com/office/drawing/2014/main" id="{6FE6777D-A5A8-8ECE-E198-76B8B3FC7CD8}"/>
+            </a:ext>
+          </a:extLst>
+        </p:cNvPr>
+        <p:cNvGrpSpPr/>
+        <p:nvPr/>
+      </p:nvGrpSpPr>
+      <p:grpSpPr>
+        <a:xfrm>
+          <a:off x="0" y="0"/>
+          <a:ext cx="0" cy="0"/>
+          <a:chOff x="0" y="0"/>
+          <a:chExt cx="0" cy="0"/>
+        </a:xfrm>
+      </p:grpSpPr>
+      <p:pic>
+        <p:nvPicPr>
+          <p:cNvPr id="3" name="Рисунок 2">
+            <a:extLst>
+              <a:ext uri="{FF2B5EF4-FFF2-40B4-BE49-F238E27FC236}">
+                <a16:creationId xmlns:a16="http://schemas.microsoft.com/office/drawing/2014/main" id="{852DCD44-5D36-CE5A-0732-83E035C88AC4}"/>
+              </a:ext>
+            </a:extLst>
+          </p:cNvPr>
+          <p:cNvPicPr>
+            <a:picLocks noChangeAspect="1"/>
+          </p:cNvPicPr>
+          <p:nvPr/>
+        </p:nvPicPr>
+        <p:blipFill>
+          <a:blip r:embed="rId2"/>
+          <a:stretch>
+            <a:fillRect/>
+          </a:stretch>
+        </p:blipFill>
+        <p:spPr>
+          <a:xfrm>
+            <a:off x="0" y="0"/>
+            <a:ext cx="24384000" cy="12854686"/>
+          </a:xfrm>
+          <a:prstGeom prst="rect">
+            <a:avLst/>
+          </a:prstGeom>
+        </p:spPr>
+      </p:pic>
+    </p:spTree>
+    <p:extLst>
+      <p:ext uri="{BB962C8B-B14F-4D97-AF65-F5344CB8AC3E}">
+        <p14:creationId xmlns:p14="http://schemas.microsoft.com/office/powerpoint/2010/main" val="1336275980"/>
+      </p:ext>
+    </p:extLst>
+  </p:cSld>
+  <p:clrMapOvr>
+    <a:masterClrMapping/>
+  </p:clrMapOvr>
+  <mc:AlternateContent xmlns:mc="http://schemas.openxmlformats.org/markup-compatibility/2006">
+    <mc:Choice xmlns:p14="http://schemas.microsoft.com/office/powerpoint/2010/main" Requires="p14">
+      <p:transition spd="med" p14:dur="700">
+        <p:fade/>
+      </p:transition>
+    </mc:Choice>
+    <mc:Fallback>
+      <p:transition spd="med">
+        <p:fade/>
+      </p:transition>
+    </mc:Fallback>
+  </mc:AlternateContent>
+</p:sld>
+</file>
+
+<file path=ppt/slides/slide23.xml><?xml version="1.0" encoding="utf-8"?>
+<p:sld xmlns:a="http://schemas.openxmlformats.org/drawingml/2006/main" xmlns:r="http://schemas.openxmlformats.org/officeDocument/2006/relationships" xmlns:p="http://schemas.openxmlformats.org/presentationml/2006/main" showMasterSp="0">
+  <p:cSld>
+    <p:spTree>
+      <p:nvGrpSpPr>
+        <p:cNvPr id="1" name="">
+          <a:extLst>
+            <a:ext uri="{FF2B5EF4-FFF2-40B4-BE49-F238E27FC236}">
+              <a16:creationId xmlns:a16="http://schemas.microsoft.com/office/drawing/2014/main" id="{63F3A18B-B811-CCC7-813C-C056B064668E}"/>
+            </a:ext>
+          </a:extLst>
+        </p:cNvPr>
+        <p:cNvGrpSpPr/>
+        <p:nvPr/>
+      </p:nvGrpSpPr>
+      <p:grpSpPr>
+        <a:xfrm>
+          <a:off x="0" y="0"/>
+          <a:ext cx="0" cy="0"/>
+          <a:chOff x="0" y="0"/>
+          <a:chExt cx="0" cy="0"/>
+        </a:xfrm>
+      </p:grpSpPr>
+      <p:pic>
+        <p:nvPicPr>
+          <p:cNvPr id="4" name="Рисунок 3">
+            <a:extLst>
+              <a:ext uri="{FF2B5EF4-FFF2-40B4-BE49-F238E27FC236}">
+                <a16:creationId xmlns:a16="http://schemas.microsoft.com/office/drawing/2014/main" id="{F62A7A1B-655B-2A3B-42A5-561BE6E0E2F4}"/>
+              </a:ext>
+            </a:extLst>
+          </p:cNvPr>
+          <p:cNvPicPr>
+            <a:picLocks noChangeAspect="1"/>
+          </p:cNvPicPr>
+          <p:nvPr/>
+        </p:nvPicPr>
+        <p:blipFill>
+          <a:blip r:embed="rId2"/>
+          <a:stretch>
+            <a:fillRect/>
+          </a:stretch>
+        </p:blipFill>
+        <p:spPr>
+          <a:xfrm>
+            <a:off x="0" y="0"/>
+            <a:ext cx="24384000" cy="12035692"/>
+          </a:xfrm>
+          <a:prstGeom prst="rect">
+            <a:avLst/>
+          </a:prstGeom>
+        </p:spPr>
+      </p:pic>
+    </p:spTree>
+    <p:extLst>
+      <p:ext uri="{BB962C8B-B14F-4D97-AF65-F5344CB8AC3E}">
+        <p14:creationId xmlns:p14="http://schemas.microsoft.com/office/powerpoint/2010/main" val="2502912673"/>
+      </p:ext>
+    </p:extLst>
+  </p:cSld>
+  <p:clrMapOvr>
+    <a:masterClrMapping/>
+  </p:clrMapOvr>
+  <mc:AlternateContent xmlns:mc="http://schemas.openxmlformats.org/markup-compatibility/2006">
+    <mc:Choice xmlns:p14="http://schemas.microsoft.com/office/powerpoint/2010/main" Requires="p14">
+      <p:transition spd="med" p14:dur="700">
+        <p:fade/>
+      </p:transition>
+    </mc:Choice>
+    <mc:Fallback>
+      <p:transition spd="med">
+        <p:fade/>
+      </p:transition>
+    </mc:Fallback>
+  </mc:AlternateContent>
+</p:sld>
+</file>
+
+<file path=ppt/slides/slide24.xml><?xml version="1.0" encoding="utf-8"?>
 <p:sld xmlns:a="http://schemas.openxmlformats.org/drawingml/2006/main" xmlns:r="http://schemas.openxmlformats.org/officeDocument/2006/relationships" xmlns:p="http://schemas.openxmlformats.org/presentationml/2006/main">
   <p:cSld>
     <p:spTree>
@@ -5274,7 +7435,7 @@
           </a:ln>
           <a:extLst>
             <a:ext uri="{C572A759-6A51-4108-AA02-DFA0A04FC94B}">
-              <ma14:wrappingTextBoxFlag xmlns:ma14="http://schemas.microsoft.com/office/mac/drawingml/2011/main" xmlns:a14="http://schemas.microsoft.com/office/drawing/2010/main" xmlns:m="http://schemas.openxmlformats.org/officeDocument/2006/math" xmlns="" val="1"/>
+              <ma14:wrappingTextBoxFlag xmlns="" xmlns:m="http://schemas.openxmlformats.org/officeDocument/2006/math" xmlns:a14="http://schemas.microsoft.com/office/drawing/2010/main" xmlns:ma14="http://schemas.microsoft.com/office/mac/drawingml/2011/main" val="1"/>
             </a:ext>
           </a:extLst>
         </p:spPr>
@@ -5345,7 +7506,7 @@
           </a:ln>
           <a:extLst>
             <a:ext uri="{C572A759-6A51-4108-AA02-DFA0A04FC94B}">
-              <ma14:wrappingTextBoxFlag xmlns:ma14="http://schemas.microsoft.com/office/mac/drawingml/2011/main" xmlns:a14="http://schemas.microsoft.com/office/drawing/2010/main" xmlns:m="http://schemas.openxmlformats.org/officeDocument/2006/math" xmlns="" val="1"/>
+              <ma14:wrappingTextBoxFlag xmlns="" xmlns:m="http://schemas.openxmlformats.org/officeDocument/2006/math" xmlns:a14="http://schemas.microsoft.com/office/drawing/2010/main" xmlns:ma14="http://schemas.microsoft.com/office/mac/drawingml/2011/main" val="1"/>
             </a:ext>
           </a:extLst>
         </p:spPr>
@@ -6216,7 +8377,7 @@
 </p:sld>
 </file>
 
-<file path=ppt/slides/slide12.xml><?xml version="1.0" encoding="utf-8"?>
+<file path=ppt/slides/slide25.xml><?xml version="1.0" encoding="utf-8"?>
 <p:sld xmlns:a="http://schemas.openxmlformats.org/drawingml/2006/main" xmlns:r="http://schemas.openxmlformats.org/officeDocument/2006/relationships" xmlns:p="http://schemas.openxmlformats.org/presentationml/2006/main">
   <p:cSld>
     <p:spTree>
@@ -6253,10 +8414,10 @@
         </p:nvGrpSpPr>
         <p:grpSpPr>
           <a:xfrm>
-            <a:off x="1472946" y="2428210"/>
-            <a:ext cx="8146577" cy="3833701"/>
+            <a:off x="1472946" y="2428211"/>
+            <a:ext cx="8146577" cy="1765443"/>
             <a:chOff x="2974322" y="5657246"/>
-            <a:chExt cx="8146578" cy="3833702"/>
+            <a:chExt cx="8146578" cy="1765443"/>
           </a:xfrm>
         </p:grpSpPr>
         <p:sp>
@@ -6274,7 +8435,7 @@
           <p:spPr>
             <a:xfrm>
               <a:off x="3489182" y="6333478"/>
-              <a:ext cx="7631718" cy="3157470"/>
+              <a:ext cx="7631718" cy="1089211"/>
             </a:xfrm>
             <a:prstGeom prst="rect">
               <a:avLst/>
@@ -6284,7 +8445,7 @@
             </a:ln>
             <a:extLst>
               <a:ext uri="{C572A759-6A51-4108-AA02-DFA0A04FC94B}">
-                <ma14:wrappingTextBoxFlag xmlns:ma14="http://schemas.microsoft.com/office/mac/drawingml/2011/main" xmlns:a14="http://schemas.microsoft.com/office/drawing/2010/main" xmlns:m="http://schemas.openxmlformats.org/officeDocument/2006/math" xmlns="" val="1"/>
+                <ma14:wrappingTextBoxFlag xmlns="" xmlns:m="http://schemas.openxmlformats.org/officeDocument/2006/math" xmlns:a14="http://schemas.microsoft.com/office/drawing/2010/main" xmlns:ma14="http://schemas.microsoft.com/office/mac/drawingml/2011/main" val="1"/>
               </a:ext>
             </a:extLst>
           </p:spPr>
@@ -6317,7 +8478,7 @@
                   <a:latin typeface="Arial" panose="020B0604020202020204" pitchFamily="34" charset="0"/>
                   <a:cs typeface="Arial" panose="020B0604020202020204" pitchFamily="34" charset="0"/>
                 </a:rPr>
-                <a:t>Благодаря ИС обслуживание покупателей станет более качественным. Например, ИС отображает печатный текст посредством монитора, сводя к нулю вероятность того, что продавец не сможет разобрать почерк другого человека.</a:t>
+                <a:t>Благодаря ИС обслуживание покупателей станет более качественным.</a:t>
               </a:r>
             </a:p>
           </p:txBody>
@@ -6347,7 +8508,7 @@
             </a:ln>
             <a:extLst>
               <a:ext uri="{C572A759-6A51-4108-AA02-DFA0A04FC94B}">
-                <ma14:wrappingTextBoxFlag xmlns:ma14="http://schemas.microsoft.com/office/mac/drawingml/2011/main" xmlns:a14="http://schemas.microsoft.com/office/drawing/2010/main" xmlns:m="http://schemas.openxmlformats.org/officeDocument/2006/math" xmlns="" val="1"/>
+                <ma14:wrappingTextBoxFlag xmlns="" xmlns:m="http://schemas.openxmlformats.org/officeDocument/2006/math" xmlns:a14="http://schemas.microsoft.com/office/drawing/2010/main" xmlns:ma14="http://schemas.microsoft.com/office/mac/drawingml/2011/main" val="1"/>
               </a:ext>
             </a:extLst>
           </p:spPr>
@@ -6481,7 +8642,7 @@
             <a:effectLst/>
             <a:extLst>
               <a:ext uri="{C572A759-6A51-4108-AA02-DFA0A04FC94B}">
-                <ma14:wrappingTextBoxFlag xmlns:ma14="http://schemas.microsoft.com/office/mac/drawingml/2011/main" xmlns:a14="http://schemas.microsoft.com/office/drawing/2010/main" xmlns:m="http://schemas.openxmlformats.org/officeDocument/2006/math" xmlns="" val="1"/>
+                <ma14:wrappingTextBoxFlag xmlns="" xmlns:m="http://schemas.openxmlformats.org/officeDocument/2006/math" xmlns:a14="http://schemas.microsoft.com/office/drawing/2010/main" xmlns:ma14="http://schemas.microsoft.com/office/mac/drawingml/2011/main" val="1"/>
               </a:ext>
             </a:extLst>
           </p:spPr>
@@ -6534,7 +8695,7 @@
         </p:nvGrpSpPr>
         <p:grpSpPr>
           <a:xfrm>
-            <a:off x="1472946" y="6448043"/>
+            <a:off x="1472945" y="5064802"/>
             <a:ext cx="9369139" cy="3833701"/>
             <a:chOff x="2974322" y="7476746"/>
             <a:chExt cx="8146578" cy="3833702"/>
@@ -6565,7 +8726,7 @@
             </a:ln>
             <a:extLst>
               <a:ext uri="{C572A759-6A51-4108-AA02-DFA0A04FC94B}">
-                <ma14:wrappingTextBoxFlag xmlns:ma14="http://schemas.microsoft.com/office/mac/drawingml/2011/main" xmlns:a14="http://schemas.microsoft.com/office/drawing/2010/main" xmlns:m="http://schemas.openxmlformats.org/officeDocument/2006/math" xmlns="" val="1"/>
+                <ma14:wrappingTextBoxFlag xmlns="" xmlns:m="http://schemas.openxmlformats.org/officeDocument/2006/math" xmlns:a14="http://schemas.microsoft.com/office/drawing/2010/main" xmlns:ma14="http://schemas.microsoft.com/office/mac/drawingml/2011/main" val="1"/>
               </a:ext>
             </a:extLst>
           </p:spPr>
@@ -6628,7 +8789,7 @@
             </a:ln>
             <a:extLst>
               <a:ext uri="{C572A759-6A51-4108-AA02-DFA0A04FC94B}">
-                <ma14:wrappingTextBoxFlag xmlns:ma14="http://schemas.microsoft.com/office/mac/drawingml/2011/main" xmlns:a14="http://schemas.microsoft.com/office/drawing/2010/main" xmlns:m="http://schemas.openxmlformats.org/officeDocument/2006/math" xmlns="" val="1"/>
+                <ma14:wrappingTextBoxFlag xmlns="" xmlns:m="http://schemas.openxmlformats.org/officeDocument/2006/math" xmlns:a14="http://schemas.microsoft.com/office/drawing/2010/main" xmlns:ma14="http://schemas.microsoft.com/office/mac/drawingml/2011/main" val="1"/>
               </a:ext>
             </a:extLst>
           </p:spPr>
@@ -6762,7 +8923,7 @@
             <a:effectLst/>
             <a:extLst>
               <a:ext uri="{C572A759-6A51-4108-AA02-DFA0A04FC94B}">
-                <ma14:wrappingTextBoxFlag xmlns:ma14="http://schemas.microsoft.com/office/mac/drawingml/2011/main" xmlns:a14="http://schemas.microsoft.com/office/drawing/2010/main" xmlns:m="http://schemas.openxmlformats.org/officeDocument/2006/math" xmlns="" val="1"/>
+                <ma14:wrappingTextBoxFlag xmlns="" xmlns:m="http://schemas.openxmlformats.org/officeDocument/2006/math" xmlns:a14="http://schemas.microsoft.com/office/drawing/2010/main" xmlns:ma14="http://schemas.microsoft.com/office/mac/drawingml/2011/main" val="1"/>
               </a:ext>
             </a:extLst>
           </p:spPr>
@@ -6815,10 +8976,10 @@
         </p:nvGrpSpPr>
         <p:grpSpPr>
           <a:xfrm>
-            <a:off x="1472946" y="10237547"/>
-            <a:ext cx="10126947" cy="2799572"/>
+            <a:off x="1472946" y="8953162"/>
+            <a:ext cx="10126947" cy="2282508"/>
             <a:chOff x="2974322" y="9296247"/>
-            <a:chExt cx="10126948" cy="2799573"/>
+            <a:chExt cx="10126948" cy="2282509"/>
           </a:xfrm>
         </p:grpSpPr>
         <p:sp>
@@ -6835,8 +8996,8 @@
           </p:nvSpPr>
           <p:spPr>
             <a:xfrm>
-              <a:off x="3489182" y="9972479"/>
-              <a:ext cx="8029291" cy="2123341"/>
+              <a:off x="3489181" y="9972479"/>
+              <a:ext cx="8854280" cy="1606277"/>
             </a:xfrm>
             <a:prstGeom prst="rect">
               <a:avLst/>
@@ -6846,7 +9007,7 @@
             </a:ln>
             <a:extLst>
               <a:ext uri="{C572A759-6A51-4108-AA02-DFA0A04FC94B}">
-                <ma14:wrappingTextBoxFlag xmlns:ma14="http://schemas.microsoft.com/office/mac/drawingml/2011/main" xmlns:a14="http://schemas.microsoft.com/office/drawing/2010/main" xmlns:m="http://schemas.openxmlformats.org/officeDocument/2006/math" xmlns="" val="1"/>
+                <ma14:wrappingTextBoxFlag xmlns="" xmlns:m="http://schemas.openxmlformats.org/officeDocument/2006/math" xmlns:a14="http://schemas.microsoft.com/office/drawing/2010/main" xmlns:ma14="http://schemas.microsoft.com/office/mac/drawingml/2011/main" val="1"/>
               </a:ext>
             </a:extLst>
           </p:spPr>
@@ -6909,7 +9070,7 @@
             </a:ln>
             <a:extLst>
               <a:ext uri="{C572A759-6A51-4108-AA02-DFA0A04FC94B}">
-                <ma14:wrappingTextBoxFlag xmlns:ma14="http://schemas.microsoft.com/office/mac/drawingml/2011/main" xmlns:a14="http://schemas.microsoft.com/office/drawing/2010/main" xmlns:m="http://schemas.openxmlformats.org/officeDocument/2006/math" xmlns="" val="1"/>
+                <ma14:wrappingTextBoxFlag xmlns="" xmlns:m="http://schemas.openxmlformats.org/officeDocument/2006/math" xmlns:a14="http://schemas.microsoft.com/office/drawing/2010/main" xmlns:ma14="http://schemas.microsoft.com/office/mac/drawingml/2011/main" val="1"/>
               </a:ext>
             </a:extLst>
           </p:spPr>
@@ -7043,7 +9204,7 @@
             <a:effectLst/>
             <a:extLst>
               <a:ext uri="{C572A759-6A51-4108-AA02-DFA0A04FC94B}">
-                <ma14:wrappingTextBoxFlag xmlns:ma14="http://schemas.microsoft.com/office/mac/drawingml/2011/main" xmlns:a14="http://schemas.microsoft.com/office/drawing/2010/main" xmlns:m="http://schemas.openxmlformats.org/officeDocument/2006/math" xmlns="" val="1"/>
+                <ma14:wrappingTextBoxFlag xmlns="" xmlns:m="http://schemas.openxmlformats.org/officeDocument/2006/math" xmlns:a14="http://schemas.microsoft.com/office/drawing/2010/main" xmlns:ma14="http://schemas.microsoft.com/office/mac/drawingml/2011/main" val="1"/>
               </a:ext>
             </a:extLst>
           </p:spPr>
@@ -7127,7 +9288,7 @@
             </a:ln>
             <a:extLst>
               <a:ext uri="{C572A759-6A51-4108-AA02-DFA0A04FC94B}">
-                <ma14:wrappingTextBoxFlag xmlns:ma14="http://schemas.microsoft.com/office/mac/drawingml/2011/main" xmlns:a14="http://schemas.microsoft.com/office/drawing/2010/main" xmlns:m="http://schemas.openxmlformats.org/officeDocument/2006/math" xmlns="" val="1"/>
+                <ma14:wrappingTextBoxFlag xmlns="" xmlns:m="http://schemas.openxmlformats.org/officeDocument/2006/math" xmlns:a14="http://schemas.microsoft.com/office/drawing/2010/main" xmlns:ma14="http://schemas.microsoft.com/office/mac/drawingml/2011/main" val="1"/>
               </a:ext>
             </a:extLst>
           </p:spPr>
@@ -7190,7 +9351,7 @@
             </a:ln>
             <a:extLst>
               <a:ext uri="{C572A759-6A51-4108-AA02-DFA0A04FC94B}">
-                <ma14:wrappingTextBoxFlag xmlns:ma14="http://schemas.microsoft.com/office/mac/drawingml/2011/main" xmlns:a14="http://schemas.microsoft.com/office/drawing/2010/main" xmlns:m="http://schemas.openxmlformats.org/officeDocument/2006/math" xmlns="" val="1"/>
+                <ma14:wrappingTextBoxFlag xmlns="" xmlns:m="http://schemas.openxmlformats.org/officeDocument/2006/math" xmlns:a14="http://schemas.microsoft.com/office/drawing/2010/main" xmlns:ma14="http://schemas.microsoft.com/office/mac/drawingml/2011/main" val="1"/>
               </a:ext>
             </a:extLst>
           </p:spPr>
@@ -7324,7 +9485,7 @@
             <a:effectLst/>
             <a:extLst>
               <a:ext uri="{C572A759-6A51-4108-AA02-DFA0A04FC94B}">
-                <ma14:wrappingTextBoxFlag xmlns:ma14="http://schemas.microsoft.com/office/mac/drawingml/2011/main" xmlns:a14="http://schemas.microsoft.com/office/drawing/2010/main" xmlns:m="http://schemas.openxmlformats.org/officeDocument/2006/math" xmlns="" val="1"/>
+                <ma14:wrappingTextBoxFlag xmlns="" xmlns:m="http://schemas.openxmlformats.org/officeDocument/2006/math" xmlns:a14="http://schemas.microsoft.com/office/drawing/2010/main" xmlns:ma14="http://schemas.microsoft.com/office/mac/drawingml/2011/main" val="1"/>
               </a:ext>
             </a:extLst>
           </p:spPr>
@@ -7378,7 +9539,7 @@
         <p:grpSpPr>
           <a:xfrm>
             <a:off x="12188188" y="6325650"/>
-            <a:ext cx="8432813" cy="3833701"/>
+            <a:ext cx="11048330" cy="3833701"/>
             <a:chOff x="12770255" y="7476746"/>
             <a:chExt cx="8432812" cy="3833702"/>
           </a:xfrm>
@@ -7408,7 +9569,7 @@
             </a:ln>
             <a:extLst>
               <a:ext uri="{C572A759-6A51-4108-AA02-DFA0A04FC94B}">
-                <ma14:wrappingTextBoxFlag xmlns:ma14="http://schemas.microsoft.com/office/mac/drawingml/2011/main" xmlns:a14="http://schemas.microsoft.com/office/drawing/2010/main" xmlns:m="http://schemas.openxmlformats.org/officeDocument/2006/math" xmlns="" val="1"/>
+                <ma14:wrappingTextBoxFlag xmlns="" xmlns:m="http://schemas.openxmlformats.org/officeDocument/2006/math" xmlns:a14="http://schemas.microsoft.com/office/drawing/2010/main" xmlns:ma14="http://schemas.microsoft.com/office/mac/drawingml/2011/main" val="1"/>
               </a:ext>
             </a:extLst>
           </p:spPr>
@@ -7481,7 +9642,7 @@
           <p:spPr>
             <a:xfrm>
               <a:off x="13287647" y="7476746"/>
-              <a:ext cx="7915420" cy="533610"/>
+              <a:ext cx="7915420" cy="964625"/>
             </a:xfrm>
             <a:prstGeom prst="rect">
               <a:avLst/>
@@ -7491,7 +9652,7 @@
             </a:ln>
             <a:extLst>
               <a:ext uri="{C572A759-6A51-4108-AA02-DFA0A04FC94B}">
-                <ma14:wrappingTextBoxFlag xmlns:ma14="http://schemas.microsoft.com/office/mac/drawingml/2011/main" xmlns:a14="http://schemas.microsoft.com/office/drawing/2010/main" xmlns:m="http://schemas.openxmlformats.org/officeDocument/2006/math" xmlns="" val="1"/>
+                <ma14:wrappingTextBoxFlag xmlns="" xmlns:m="http://schemas.openxmlformats.org/officeDocument/2006/math" xmlns:a14="http://schemas.microsoft.com/office/drawing/2010/main" xmlns:ma14="http://schemas.microsoft.com/office/mac/drawingml/2011/main" val="1"/>
               </a:ext>
             </a:extLst>
           </p:spPr>
@@ -7513,6 +9674,16 @@
               </a:lvl1pPr>
             </a:lstStyle>
             <a:p>
+              <a:r>
+                <a:rPr lang="ru-RU" sz="2801" b="1" dirty="0">
+                  <a:solidFill>
+                    <a:schemeClr val="tx1"/>
+                  </a:solidFill>
+                  <a:latin typeface="Arial" panose="020B0604020202020204" pitchFamily="34" charset="0"/>
+                  <a:cs typeface="Arial" panose="020B0604020202020204" pitchFamily="34" charset="0"/>
+                </a:rPr>
+                <a:t>Дополнительные возможности благодаря </a:t>
+              </a:r>
               <a:r>
                 <a:rPr lang="en-US" sz="2801" b="1" dirty="0">
                   <a:solidFill>
@@ -7625,7 +9796,7 @@
             <a:effectLst/>
             <a:extLst>
               <a:ext uri="{C572A759-6A51-4108-AA02-DFA0A04FC94B}">
-                <ma14:wrappingTextBoxFlag xmlns:ma14="http://schemas.microsoft.com/office/mac/drawingml/2011/main" xmlns:a14="http://schemas.microsoft.com/office/drawing/2010/main" xmlns:m="http://schemas.openxmlformats.org/officeDocument/2006/math" xmlns="" val="1"/>
+                <ma14:wrappingTextBoxFlag xmlns="" xmlns:m="http://schemas.openxmlformats.org/officeDocument/2006/math" xmlns:a14="http://schemas.microsoft.com/office/drawing/2010/main" xmlns:ma14="http://schemas.microsoft.com/office/mac/drawingml/2011/main" val="1"/>
               </a:ext>
             </a:extLst>
           </p:spPr>
@@ -7689,7 +9860,7 @@
           </a:ln>
           <a:extLst>
             <a:ext uri="{C572A759-6A51-4108-AA02-DFA0A04FC94B}">
-              <ma14:wrappingTextBoxFlag xmlns:ma14="http://schemas.microsoft.com/office/mac/drawingml/2011/main" xmlns:a14="http://schemas.microsoft.com/office/drawing/2010/main" xmlns:m="http://schemas.openxmlformats.org/officeDocument/2006/math" xmlns="" val="1"/>
+              <ma14:wrappingTextBoxFlag xmlns="" xmlns:m="http://schemas.openxmlformats.org/officeDocument/2006/math" xmlns:a14="http://schemas.microsoft.com/office/drawing/2010/main" xmlns:ma14="http://schemas.microsoft.com/office/mac/drawingml/2011/main" val="1"/>
             </a:ext>
           </a:extLst>
         </p:spPr>
@@ -7739,7 +9910,7 @@
         </p:nvSpPr>
         <p:spPr>
           <a:xfrm rot="2747460">
-            <a:off x="16815594" y="1268442"/>
+            <a:off x="16546653" y="1278019"/>
             <a:ext cx="1274776" cy="160860"/>
           </a:xfrm>
           <a:prstGeom prst="rect">
@@ -7803,7 +9974,7 @@
         </p:nvSpPr>
         <p:spPr>
           <a:xfrm rot="2747460">
-            <a:off x="7932599" y="2685992"/>
+            <a:off x="7601370" y="2685993"/>
             <a:ext cx="528354" cy="113752"/>
           </a:xfrm>
           <a:prstGeom prst="rect">
@@ -7867,7 +10038,7 @@
         </p:nvSpPr>
         <p:spPr>
           <a:xfrm rot="2747460">
-            <a:off x="7707624" y="6386761"/>
+            <a:off x="7601369" y="5260506"/>
             <a:ext cx="528354" cy="113752"/>
           </a:xfrm>
           <a:prstGeom prst="rect">
@@ -7931,7 +10102,7 @@
         </p:nvSpPr>
         <p:spPr>
           <a:xfrm rot="2747460">
-            <a:off x="5939711" y="10342079"/>
+            <a:off x="5873650" y="9166287"/>
             <a:ext cx="528354" cy="113752"/>
           </a:xfrm>
           <a:prstGeom prst="rect">
@@ -7995,7 +10166,7 @@
         </p:nvSpPr>
         <p:spPr>
           <a:xfrm rot="2747460">
-            <a:off x="20581799" y="2979990"/>
+            <a:off x="20581799" y="2874312"/>
             <a:ext cx="528354" cy="113752"/>
           </a:xfrm>
           <a:prstGeom prst="rect">
@@ -8059,7 +10230,7 @@
         </p:nvSpPr>
         <p:spPr>
           <a:xfrm rot="2747460">
-            <a:off x="13621178" y="6535579"/>
+            <a:off x="21330825" y="6572103"/>
             <a:ext cx="528354" cy="113752"/>
           </a:xfrm>
           <a:prstGeom prst="rect">
@@ -8134,7 +10305,238 @@
 </p:sld>
 </file>
 
-<file path=ppt/slides/slide13.xml><?xml version="1.0" encoding="utf-8"?>
+<file path=ppt/slides/slide26.xml><?xml version="1.0" encoding="utf-8"?>
+<p:sld xmlns:a="http://schemas.openxmlformats.org/drawingml/2006/main" xmlns:r="http://schemas.openxmlformats.org/officeDocument/2006/relationships" xmlns:p="http://schemas.openxmlformats.org/presentationml/2006/main">
+  <p:cSld>
+    <p:spTree>
+      <p:nvGrpSpPr>
+        <p:cNvPr id="1" name="">
+          <a:extLst>
+            <a:ext uri="{FF2B5EF4-FFF2-40B4-BE49-F238E27FC236}">
+              <a16:creationId xmlns:a16="http://schemas.microsoft.com/office/drawing/2014/main" id="{716FD95D-67E5-AEFA-B006-01D198B133DC}"/>
+            </a:ext>
+          </a:extLst>
+        </p:cNvPr>
+        <p:cNvGrpSpPr/>
+        <p:nvPr/>
+      </p:nvGrpSpPr>
+      <p:grpSpPr>
+        <a:xfrm>
+          <a:off x="0" y="0"/>
+          <a:ext cx="0" cy="0"/>
+          <a:chOff x="0" y="0"/>
+          <a:chExt cx="0" cy="0"/>
+        </a:xfrm>
+      </p:grpSpPr>
+      <p:sp>
+        <p:nvSpPr>
+          <p:cNvPr id="648" name="Rectangle">
+            <a:extLst>
+              <a:ext uri="{FF2B5EF4-FFF2-40B4-BE49-F238E27FC236}">
+                <a16:creationId xmlns:a16="http://schemas.microsoft.com/office/drawing/2014/main" id="{EECEC43C-AD0D-E265-76E2-3F0BA1885785}"/>
+              </a:ext>
+            </a:extLst>
+          </p:cNvPr>
+          <p:cNvSpPr/>
+          <p:nvPr/>
+        </p:nvSpPr>
+        <p:spPr>
+          <a:xfrm>
+            <a:off x="1" y="-16933"/>
+            <a:ext cx="11913130" cy="13732935"/>
+          </a:xfrm>
+          <a:prstGeom prst="rect">
+            <a:avLst/>
+          </a:prstGeom>
+          <a:gradFill>
+            <a:gsLst>
+              <a:gs pos="1000">
+                <a:srgbClr val="C80D3F"/>
+              </a:gs>
+              <a:gs pos="51000">
+                <a:srgbClr val="DF2935"/>
+              </a:gs>
+              <a:gs pos="100000">
+                <a:srgbClr val="FF5E62"/>
+              </a:gs>
+            </a:gsLst>
+            <a:lin ang="0" scaled="0"/>
+          </a:gradFill>
+          <a:ln w="12700">
+            <a:miter lim="400000"/>
+          </a:ln>
+        </p:spPr>
+        <p:txBody>
+          <a:bodyPr lIns="0" tIns="0" rIns="0" bIns="0" anchor="ctr"/>
+          <a:lstStyle/>
+          <a:p>
+            <a:pPr>
+              <a:defRPr sz="3200" b="0">
+                <a:solidFill>
+                  <a:srgbClr val="FFFFFF"/>
+                </a:solidFill>
+                <a:latin typeface="+mn-lt"/>
+                <a:ea typeface="+mn-ea"/>
+                <a:cs typeface="+mn-cs"/>
+                <a:sym typeface="Helvetica Neue Medium"/>
+              </a:defRPr>
+            </a:pPr>
+            <a:endParaRPr sz="3200" dirty="0">
+              <a:latin typeface="Arial Black" panose="020B0604020202020204" pitchFamily="34" charset="0"/>
+              <a:cs typeface="Arial Black" panose="020B0604020202020204" pitchFamily="34" charset="0"/>
+            </a:endParaRPr>
+          </a:p>
+        </p:txBody>
+      </p:sp>
+      <p:sp>
+        <p:nvSpPr>
+          <p:cNvPr id="676" name="All the world is made of faith, and trust, and pixie dust.">
+            <a:extLst>
+              <a:ext uri="{FF2B5EF4-FFF2-40B4-BE49-F238E27FC236}">
+                <a16:creationId xmlns:a16="http://schemas.microsoft.com/office/drawing/2014/main" id="{5A7F6EAD-09A0-BC63-7110-D5D82708BC60}"/>
+              </a:ext>
+            </a:extLst>
+          </p:cNvPr>
+          <p:cNvSpPr txBox="1"/>
+          <p:nvPr/>
+        </p:nvSpPr>
+        <p:spPr>
+          <a:xfrm>
+            <a:off x="1435467" y="2369345"/>
+            <a:ext cx="9776820" cy="872357"/>
+          </a:xfrm>
+          <a:prstGeom prst="rect">
+            <a:avLst/>
+          </a:prstGeom>
+          <a:ln w="12700">
+            <a:miter lim="400000"/>
+          </a:ln>
+          <a:extLst>
+            <a:ext uri="{C572A759-6A51-4108-AA02-DFA0A04FC94B}">
+              <ma14:wrappingTextBoxFlag xmlns:ma14="http://schemas.microsoft.com/office/mac/drawingml/2011/main" xmlns:a14="http://schemas.microsoft.com/office/drawing/2010/main" xmlns:m="http://schemas.openxmlformats.org/officeDocument/2006/math" xmlns="" val="1"/>
+            </a:ext>
+          </a:extLst>
+        </p:spPr>
+        <p:txBody>
+          <a:bodyPr wrap="square" lIns="50801" tIns="50801" rIns="50801" bIns="50801">
+            <a:spAutoFit/>
+          </a:bodyPr>
+          <a:lstStyle>
+            <a:lvl1pPr algn="l">
+              <a:defRPr sz="5000" b="0">
+                <a:solidFill>
+                  <a:srgbClr val="242423"/>
+                </a:solidFill>
+                <a:latin typeface="Montserrat Bold"/>
+                <a:ea typeface="Montserrat Bold"/>
+                <a:cs typeface="Montserrat Bold"/>
+                <a:sym typeface="Montserrat Bold"/>
+              </a:defRPr>
+            </a:lvl1pPr>
+          </a:lstStyle>
+          <a:p>
+            <a:r>
+              <a:rPr lang="ru-RU" sz="5002" b="1" dirty="0">
+                <a:solidFill>
+                  <a:schemeClr val="bg1"/>
+                </a:solidFill>
+                <a:latin typeface="Arial" panose="020B0604020202020204" pitchFamily="34" charset="0"/>
+                <a:cs typeface="Arial" panose="020B0604020202020204" pitchFamily="34" charset="0"/>
+              </a:rPr>
+              <a:t>Заключение</a:t>
+            </a:r>
+          </a:p>
+        </p:txBody>
+      </p:sp>
+      <p:sp>
+        <p:nvSpPr>
+          <p:cNvPr id="80" name="Lorem ipsum dolor sit amet, consectetur adipiscing elit, sed do eiusmod tempor incididunt ut labore et dolore magna aliqua. Arcu dictum varius duis at lorem donec. Volutpat maecenas volutpat blandit aliquam. Egestas quis ipsum suspendisse ultrices gravid">
+            <a:extLst>
+              <a:ext uri="{FF2B5EF4-FFF2-40B4-BE49-F238E27FC236}">
+                <a16:creationId xmlns:a16="http://schemas.microsoft.com/office/drawing/2014/main" id="{C0C55308-AF23-1C88-3D57-FD380BBC98E7}"/>
+              </a:ext>
+            </a:extLst>
+          </p:cNvPr>
+          <p:cNvSpPr txBox="1"/>
+          <p:nvPr/>
+        </p:nvSpPr>
+        <p:spPr>
+          <a:xfrm>
+            <a:off x="1462466" y="3920654"/>
+            <a:ext cx="8988200" cy="1371083"/>
+          </a:xfrm>
+          <a:prstGeom prst="rect">
+            <a:avLst/>
+          </a:prstGeom>
+          <a:ln w="12700">
+            <a:miter lim="400000"/>
+          </a:ln>
+          <a:extLst>
+            <a:ext uri="{C572A759-6A51-4108-AA02-DFA0A04FC94B}">
+              <ma14:wrappingTextBoxFlag xmlns:ma14="http://schemas.microsoft.com/office/mac/drawingml/2011/main" xmlns:a14="http://schemas.microsoft.com/office/drawing/2010/main" xmlns:m="http://schemas.openxmlformats.org/officeDocument/2006/math" xmlns="" val="1"/>
+            </a:ext>
+          </a:extLst>
+        </p:spPr>
+        <p:txBody>
+          <a:bodyPr wrap="square" lIns="50801" tIns="50801" rIns="50801" bIns="50801">
+            <a:spAutoFit/>
+          </a:bodyPr>
+          <a:lstStyle>
+            <a:lvl1pPr algn="l" defTabSz="457200">
+              <a:lnSpc>
+                <a:spcPct val="120000"/>
+              </a:lnSpc>
+              <a:defRPr sz="2200" b="0">
+                <a:solidFill>
+                  <a:srgbClr val="7F8189"/>
+                </a:solidFill>
+                <a:latin typeface="Arial"/>
+                <a:ea typeface="Arial"/>
+                <a:cs typeface="Arial"/>
+                <a:sym typeface="Arial"/>
+              </a:defRPr>
+            </a:lvl1pPr>
+          </a:lstStyle>
+          <a:p>
+            <a:r>
+              <a:rPr lang="ru-RU" sz="3600" dirty="0">
+                <a:solidFill>
+                  <a:schemeClr val="bg1"/>
+                </a:solidFill>
+                <a:latin typeface="Arial" panose="020B0604020202020204" pitchFamily="34" charset="0"/>
+                <a:cs typeface="Arial" panose="020B0604020202020204" pitchFamily="34" charset="0"/>
+              </a:rPr>
+              <a:t>Все задачи были пошагово выполнены в работе. Цель достигнута.</a:t>
+            </a:r>
+          </a:p>
+        </p:txBody>
+      </p:sp>
+    </p:spTree>
+    <p:extLst>
+      <p:ext uri="{BB962C8B-B14F-4D97-AF65-F5344CB8AC3E}">
+        <p14:creationId xmlns:p14="http://schemas.microsoft.com/office/powerpoint/2010/main" val="3931180721"/>
+      </p:ext>
+    </p:extLst>
+  </p:cSld>
+  <p:clrMapOvr>
+    <a:masterClrMapping/>
+  </p:clrMapOvr>
+  <mc:AlternateContent xmlns:mc="http://schemas.openxmlformats.org/markup-compatibility/2006">
+    <mc:Choice xmlns:p14="http://schemas.microsoft.com/office/powerpoint/2010/main" Requires="p14">
+      <p:transition spd="med" p14:dur="700">
+        <p:fade/>
+      </p:transition>
+    </mc:Choice>
+    <mc:Fallback>
+      <p:transition spd="med">
+        <p:fade/>
+      </p:transition>
+    </mc:Fallback>
+  </mc:AlternateContent>
+</p:sld>
+</file>
+
+<file path=ppt/slides/slide27.xml><?xml version="1.0" encoding="utf-8"?>
 <p:sld xmlns:a="http://schemas.openxmlformats.org/drawingml/2006/main" xmlns:r="http://schemas.openxmlformats.org/officeDocument/2006/relationships" xmlns:p="http://schemas.openxmlformats.org/presentationml/2006/main">
   <p:cSld>
     <p:spTree>
@@ -8886,331 +11288,6 @@
 </p:sld>
 </file>
 
-<file path=ppt/slides/slide2.xml><?xml version="1.0" encoding="utf-8"?>
-<p:sld xmlns:a="http://schemas.openxmlformats.org/drawingml/2006/main" xmlns:r="http://schemas.openxmlformats.org/officeDocument/2006/relationships" xmlns:p="http://schemas.openxmlformats.org/presentationml/2006/main">
-  <p:cSld>
-    <p:spTree>
-      <p:nvGrpSpPr>
-        <p:cNvPr id="1" name=""/>
-        <p:cNvGrpSpPr/>
-        <p:nvPr/>
-      </p:nvGrpSpPr>
-      <p:grpSpPr>
-        <a:xfrm>
-          <a:off x="0" y="0"/>
-          <a:ext cx="0" cy="0"/>
-          <a:chOff x="0" y="0"/>
-          <a:chExt cx="0" cy="0"/>
-        </a:xfrm>
-      </p:grpSpPr>
-      <p:sp>
-        <p:nvSpPr>
-          <p:cNvPr id="61" name="Subtitle Text"/>
-          <p:cNvSpPr/>
-          <p:nvPr/>
-        </p:nvSpPr>
-        <p:spPr>
-          <a:xfrm>
-            <a:off x="1427164" y="2266950"/>
-            <a:ext cx="3322710" cy="337530"/>
-          </a:xfrm>
-          <a:custGeom>
-            <a:avLst/>
-            <a:gdLst/>
-            <a:ahLst/>
-            <a:cxnLst>
-              <a:cxn ang="0">
-                <a:pos x="wd2" y="hd2"/>
-              </a:cxn>
-              <a:cxn ang="5400000">
-                <a:pos x="wd2" y="hd2"/>
-              </a:cxn>
-              <a:cxn ang="10800000">
-                <a:pos x="wd2" y="hd2"/>
-              </a:cxn>
-              <a:cxn ang="16200000">
-                <a:pos x="wd2" y="hd2"/>
-              </a:cxn>
-            </a:cxnLst>
-            <a:rect l="0" t="0" r="r" b="b"/>
-            <a:pathLst>
-              <a:path w="21600" extrusionOk="0">
-                <a:moveTo>
-                  <a:pt x="0" y="0"/>
-                </a:moveTo>
-                <a:lnTo>
-                  <a:pt x="21600" y="0"/>
-                </a:lnTo>
-                <a:lnTo>
-                  <a:pt x="21600" y="0"/>
-                </a:lnTo>
-                <a:lnTo>
-                  <a:pt x="0" y="0"/>
-                </a:lnTo>
-                <a:close/>
-              </a:path>
-            </a:pathLst>
-          </a:custGeom>
-          <a:noFill/>
-          <a:ln w="12700" cap="flat">
-            <a:noFill/>
-            <a:miter lim="400000"/>
-          </a:ln>
-          <a:effectLst/>
-          <a:extLst>
-            <a:ext uri="{C572A759-6A51-4108-AA02-DFA0A04FC94B}">
-              <ma14:wrappingTextBoxFlag xmlns:ma14="http://schemas.microsoft.com/office/mac/drawingml/2011/main" xmlns:a14="http://schemas.microsoft.com/office/drawing/2010/main" xmlns:m="http://schemas.openxmlformats.org/officeDocument/2006/math" xmlns="" val="1"/>
-            </a:ext>
-          </a:extLst>
-        </p:spPr>
-        <p:txBody>
-          <a:bodyPr wrap="square" lIns="50801" tIns="50801" rIns="50801" bIns="50801" numCol="1" anchor="t">
-            <a:spAutoFit/>
-          </a:bodyPr>
-          <a:lstStyle>
-            <a:lvl1pPr algn="l" defTabSz="457200">
-              <a:lnSpc>
-                <a:spcPct val="120000"/>
-              </a:lnSpc>
-              <a:defRPr sz="1400" cap="all" spc="1120">
-                <a:solidFill>
-                  <a:srgbClr val="242423"/>
-                </a:solidFill>
-                <a:latin typeface="Arial"/>
-                <a:ea typeface="Arial"/>
-                <a:cs typeface="Arial"/>
-                <a:sym typeface="Arial"/>
-              </a:defRPr>
-            </a:lvl1pPr>
-          </a:lstStyle>
-          <a:p>
-            <a:r>
-              <a:rPr sz="1401" dirty="0">
-                <a:solidFill>
-                  <a:schemeClr val="tx1"/>
-                </a:solidFill>
-                <a:latin typeface="Arial" panose="020B0604020202020204" pitchFamily="34" charset="0"/>
-                <a:cs typeface="Arial" panose="020B0604020202020204" pitchFamily="34" charset="0"/>
-              </a:rPr>
-              <a:t> </a:t>
-            </a:r>
-          </a:p>
-        </p:txBody>
-      </p:sp>
-      <p:sp>
-        <p:nvSpPr>
-          <p:cNvPr id="2" name="TextBox 1">
-            <a:extLst>
-              <a:ext uri="{FF2B5EF4-FFF2-40B4-BE49-F238E27FC236}">
-                <a16:creationId xmlns:a16="http://schemas.microsoft.com/office/drawing/2014/main" id="{1AB53D68-F6BD-D3C6-A1A4-28D1B34FF467}"/>
-              </a:ext>
-            </a:extLst>
-          </p:cNvPr>
-          <p:cNvSpPr txBox="1"/>
-          <p:nvPr/>
-        </p:nvSpPr>
-        <p:spPr>
-          <a:xfrm>
-            <a:off x="1586227" y="2803553"/>
-            <a:ext cx="17005204" cy="1067825"/>
-          </a:xfrm>
-          <a:prstGeom prst="rect">
-            <a:avLst/>
-          </a:prstGeom>
-          <a:gradFill>
-            <a:gsLst>
-              <a:gs pos="1000">
-                <a:srgbClr val="C80D3F"/>
-              </a:gs>
-              <a:gs pos="20000">
-                <a:srgbClr val="DF2935"/>
-              </a:gs>
-              <a:gs pos="43000">
-                <a:srgbClr val="FF5E62"/>
-              </a:gs>
-            </a:gsLst>
-            <a:lin ang="0" scaled="0"/>
-          </a:gradFill>
-        </p:spPr>
-        <p:txBody>
-          <a:bodyPr wrap="square" rtlCol="0" anchor="ctr" anchorCtr="0">
-            <a:noAutofit/>
-          </a:bodyPr>
-          <a:lstStyle/>
-          <a:p>
-            <a:pPr algn="ctr"/>
-            <a:r>
-              <a:rPr lang="ru-RU" sz="5644" spc="188" dirty="0">
-                <a:solidFill>
-                  <a:schemeClr val="bg1"/>
-                </a:solidFill>
-                <a:latin typeface="+mj-lt"/>
-              </a:rPr>
-              <a:t>Актуальность темы исследования</a:t>
-            </a:r>
-          </a:p>
-        </p:txBody>
-      </p:sp>
-      <p:sp>
-        <p:nvSpPr>
-          <p:cNvPr id="3" name="TextBox 2">
-            <a:extLst>
-              <a:ext uri="{FF2B5EF4-FFF2-40B4-BE49-F238E27FC236}">
-                <a16:creationId xmlns:a16="http://schemas.microsoft.com/office/drawing/2014/main" id="{3BAB6FB0-34DD-8BCF-2FFC-88EF2AAB1730}"/>
-              </a:ext>
-            </a:extLst>
-          </p:cNvPr>
-          <p:cNvSpPr txBox="1"/>
-          <p:nvPr/>
-        </p:nvSpPr>
-        <p:spPr>
-          <a:xfrm>
-            <a:off x="2273963" y="4358490"/>
-            <a:ext cx="16285312" cy="4963309"/>
-          </a:xfrm>
-          <a:prstGeom prst="rect">
-            <a:avLst/>
-          </a:prstGeom>
-          <a:noFill/>
-        </p:spPr>
-        <p:txBody>
-          <a:bodyPr wrap="square" lIns="0" tIns="0" rIns="0" bIns="0" rtlCol="0">
-            <a:noAutofit/>
-          </a:bodyPr>
-          <a:lstStyle/>
-          <a:p>
-            <a:pPr algn="just">
-              <a:spcAft>
-                <a:spcPts val="3387"/>
-              </a:spcAft>
-            </a:pPr>
-            <a:r>
-              <a:rPr lang="ru-RU" sz="4000" dirty="0">
-                <a:latin typeface="+mn-lt"/>
-              </a:rPr>
-              <a:t>Актуальность обосновывается тем, что в современном мире одна часть работы – автоматизирована, а другая – нет. Соответственно, для улучшения качества жизни людей необходимо внедрять автоматизацию везде, где это возможно, включая продажи музыкального оборудования.</a:t>
-            </a:r>
-            <a:endParaRPr lang="ru-RU" sz="5644" dirty="0">
-              <a:latin typeface="+mn-lt"/>
-            </a:endParaRPr>
-          </a:p>
-        </p:txBody>
-      </p:sp>
-      <p:sp>
-        <p:nvSpPr>
-          <p:cNvPr id="4" name="Oval 10">
-            <a:extLst>
-              <a:ext uri="{FF2B5EF4-FFF2-40B4-BE49-F238E27FC236}">
-                <a16:creationId xmlns:a16="http://schemas.microsoft.com/office/drawing/2014/main" id="{79BA2B61-3572-37A6-E552-50201A3E9DE6}"/>
-              </a:ext>
-            </a:extLst>
-          </p:cNvPr>
-          <p:cNvSpPr/>
-          <p:nvPr/>
-        </p:nvSpPr>
-        <p:spPr>
-          <a:xfrm>
-            <a:off x="1569767" y="4414335"/>
-            <a:ext cx="325111" cy="325111"/>
-          </a:xfrm>
-          <a:prstGeom prst="ellipse">
-            <a:avLst/>
-          </a:prstGeom>
-          <a:solidFill>
-            <a:schemeClr val="accent1"/>
-          </a:solidFill>
-          <a:ln>
-            <a:noFill/>
-          </a:ln>
-        </p:spPr>
-        <p:style>
-          <a:lnRef idx="2">
-            <a:schemeClr val="accent1">
-              <a:shade val="50000"/>
-            </a:schemeClr>
-          </a:lnRef>
-          <a:fillRef idx="1">
-            <a:schemeClr val="accent1"/>
-          </a:fillRef>
-          <a:effectRef idx="0">
-            <a:schemeClr val="accent1"/>
-          </a:effectRef>
-          <a:fontRef idx="minor">
-            <a:schemeClr val="lt1"/>
-          </a:fontRef>
-        </p:style>
-        <p:txBody>
-          <a:bodyPr rtlCol="0" anchor="ctr"/>
-          <a:lstStyle/>
-          <a:p>
-            <a:pPr algn="ctr"/>
-            <a:endParaRPr lang="ru-RU" sz="5644"/>
-          </a:p>
-        </p:txBody>
-      </p:sp>
-      <p:cxnSp>
-        <p:nvCxnSpPr>
-          <p:cNvPr id="7" name="Straight Connector 14">
-            <a:extLst>
-              <a:ext uri="{FF2B5EF4-FFF2-40B4-BE49-F238E27FC236}">
-                <a16:creationId xmlns:a16="http://schemas.microsoft.com/office/drawing/2014/main" id="{8969CC08-750C-30A1-06CD-244017F1488D}"/>
-              </a:ext>
-            </a:extLst>
-          </p:cNvPr>
-          <p:cNvCxnSpPr>
-            <a:cxnSpLocks/>
-          </p:cNvCxnSpPr>
-          <p:nvPr/>
-        </p:nvCxnSpPr>
-        <p:spPr>
-          <a:xfrm>
-            <a:off x="1732326" y="4868435"/>
-            <a:ext cx="0" cy="2536412"/>
-          </a:xfrm>
-          <a:prstGeom prst="line">
-            <a:avLst/>
-          </a:prstGeom>
-          <a:ln w="12700">
-            <a:solidFill>
-              <a:srgbClr val="A30236"/>
-            </a:solidFill>
-          </a:ln>
-        </p:spPr>
-        <p:style>
-          <a:lnRef idx="1">
-            <a:schemeClr val="accent1"/>
-          </a:lnRef>
-          <a:fillRef idx="0">
-            <a:schemeClr val="accent1"/>
-          </a:fillRef>
-          <a:effectRef idx="0">
-            <a:schemeClr val="accent1"/>
-          </a:effectRef>
-          <a:fontRef idx="minor">
-            <a:schemeClr val="tx1"/>
-          </a:fontRef>
-        </p:style>
-      </p:cxnSp>
-    </p:spTree>
-  </p:cSld>
-  <p:clrMapOvr>
-    <a:masterClrMapping/>
-  </p:clrMapOvr>
-  <mc:AlternateContent xmlns:mc="http://schemas.openxmlformats.org/markup-compatibility/2006" xmlns:p14="http://schemas.microsoft.com/office/powerpoint/2010/main">
-    <mc:Choice Requires="p14">
-      <p:transition spd="med" p14:dur="700">
-        <p:fade/>
-      </p:transition>
-    </mc:Choice>
-    <mc:Fallback xmlns="">
-      <p:transition spd="med">
-        <p:fade/>
-      </p:transition>
-    </mc:Fallback>
-  </mc:AlternateContent>
-</p:sld>
-</file>
-
 <file path=ppt/slides/slide3.xml><?xml version="1.0" encoding="utf-8"?>
 <p:sld xmlns:a="http://schemas.openxmlformats.org/drawingml/2006/main" xmlns:r="http://schemas.openxmlformats.org/officeDocument/2006/relationships" xmlns:p="http://schemas.openxmlformats.org/presentationml/2006/main">
   <p:cSld>
@@ -9296,7 +11373,7 @@
           <a:effectLst/>
           <a:extLst>
             <a:ext uri="{C572A759-6A51-4108-AA02-DFA0A04FC94B}">
-              <ma14:wrappingTextBoxFlag xmlns="" xmlns:m="http://schemas.openxmlformats.org/officeDocument/2006/math" xmlns:a14="http://schemas.microsoft.com/office/drawing/2010/main" xmlns:ma14="http://schemas.microsoft.com/office/mac/drawingml/2011/main" val="1"/>
+              <ma14:wrappingTextBoxFlag xmlns:ma14="http://schemas.microsoft.com/office/mac/drawingml/2011/main" xmlns:a14="http://schemas.microsoft.com/office/drawing/2010/main" xmlns:m="http://schemas.openxmlformats.org/officeDocument/2006/math" xmlns="" val="1"/>
             </a:ext>
           </a:extLst>
         </p:spPr>
@@ -9872,7 +11949,7 @@
           <a:effectLst/>
           <a:extLst>
             <a:ext uri="{C572A759-6A51-4108-AA02-DFA0A04FC94B}">
-              <ma14:wrappingTextBoxFlag xmlns:ma14="http://schemas.microsoft.com/office/mac/drawingml/2011/main" xmlns:a14="http://schemas.microsoft.com/office/drawing/2010/main" xmlns:m="http://schemas.openxmlformats.org/officeDocument/2006/math" xmlns="" val="1"/>
+              <ma14:wrappingTextBoxFlag xmlns="" xmlns:m="http://schemas.openxmlformats.org/officeDocument/2006/math" xmlns:a14="http://schemas.microsoft.com/office/drawing/2010/main" xmlns:ma14="http://schemas.microsoft.com/office/mac/drawingml/2011/main" val="1"/>
             </a:ext>
           </a:extLst>
         </p:spPr>
@@ -10341,8 +12418,8 @@
         </p:nvSpPr>
         <p:spPr>
           <a:xfrm>
-            <a:off x="11544300" y="2191655"/>
-            <a:ext cx="11722100" cy="1764588"/>
+            <a:off x="5334000" y="2185512"/>
+            <a:ext cx="13716000" cy="933591"/>
           </a:xfrm>
           <a:prstGeom prst="rect">
             <a:avLst/>
@@ -10352,7 +12429,7 @@
           </a:ln>
           <a:extLst>
             <a:ext uri="{C572A759-6A51-4108-AA02-DFA0A04FC94B}">
-              <ma14:wrappingTextBoxFlag xmlns:ma14="http://schemas.microsoft.com/office/mac/drawingml/2011/main" xmlns:a14="http://schemas.microsoft.com/office/drawing/2010/main" xmlns:m="http://schemas.openxmlformats.org/officeDocument/2006/math" xmlns="" val="1"/>
+              <ma14:wrappingTextBoxFlag xmlns="" xmlns:m="http://schemas.openxmlformats.org/officeDocument/2006/math" xmlns:a14="http://schemas.microsoft.com/office/drawing/2010/main" xmlns:ma14="http://schemas.microsoft.com/office/mac/drawingml/2011/main" val="1"/>
             </a:ext>
           </a:extLst>
         </p:spPr>
@@ -10396,7 +12473,7 @@
         <p:spPr>
           <a:xfrm>
             <a:off x="466165" y="4473743"/>
-            <a:ext cx="22644847" cy="4030272"/>
+            <a:ext cx="9215717" cy="6024665"/>
           </a:xfrm>
           <a:prstGeom prst="rect">
             <a:avLst/>
@@ -10406,7 +12483,7 @@
           </a:ln>
           <a:extLst>
             <a:ext uri="{C572A759-6A51-4108-AA02-DFA0A04FC94B}">
-              <ma14:wrappingTextBoxFlag xmlns:ma14="http://schemas.microsoft.com/office/mac/drawingml/2011/main" xmlns:a14="http://schemas.microsoft.com/office/drawing/2010/main" xmlns:m="http://schemas.openxmlformats.org/officeDocument/2006/math" xmlns="" val="1"/>
+              <ma14:wrappingTextBoxFlag xmlns="" xmlns:m="http://schemas.openxmlformats.org/officeDocument/2006/math" xmlns:a14="http://schemas.microsoft.com/office/drawing/2010/main" xmlns:ma14="http://schemas.microsoft.com/office/mac/drawingml/2011/main" val="1"/>
             </a:ext>
           </a:extLst>
         </p:spPr>
@@ -10458,8 +12535,76 @@
                 <a:latin typeface="Arial" panose="020B0604020202020204" pitchFamily="34" charset="0"/>
                 <a:cs typeface="Arial" panose="020B0604020202020204" pitchFamily="34" charset="0"/>
               </a:rPr>
-              <a:t>») - экосистема для музыкантов и крупнейшая сеть из 41 музыкальных магазинов в России. Также данная организация имеет интернет-магазин, где представлен широкий ассортимент товаров для начинающих и профессиональных музыкантов. Присутствуют удобные сервисы и услуги: возможность продать б/у инструмент на дочернем сайте, репетиционные базы, музыкальные курсы, аренда и настройка инструментов, рассрочка и кредит, доставка, сервисные центры. Данная компания – официальный дилер 600 мировых брендов.</a:t>
+              <a:t>») – экосистема для музыкантов и крупнейшая сеть из 41 музыкальных магазинов в России.</a:t>
             </a:r>
+          </a:p>
+          <a:p>
+            <a:pPr algn="just" defTabSz="457248">
+              <a:lnSpc>
+                <a:spcPct val="120000"/>
+              </a:lnSpc>
+              <a:defRPr sz="2200" b="0">
+                <a:solidFill>
+                  <a:srgbClr val="7F8189"/>
+                </a:solidFill>
+                <a:latin typeface="Arial"/>
+                <a:ea typeface="Arial"/>
+                <a:cs typeface="Arial"/>
+                <a:sym typeface="Arial"/>
+              </a:defRPr>
+            </a:pPr>
+            <a:r>
+              <a:rPr kumimoji="0" lang="ru-RU" sz="3600" b="0" i="0" u="none" strike="noStrike" cap="none" spc="0" normalizeH="0" baseline="0" dirty="0">
+                <a:ln>
+                  <a:noFill/>
+                </a:ln>
+                <a:solidFill>
+                  <a:srgbClr val="000000"/>
+                </a:solidFill>
+                <a:uFillTx/>
+                <a:latin typeface="+mn-lt"/>
+                <a:cs typeface="Helvetica Neue"/>
+                <a:sym typeface="Helvetica Neue"/>
+              </a:rPr>
+              <a:t>ОКВЭД-2: 47.59.5: Торговля розничная музыкальными инструментами и нотными изданиями в специализированных магазинах.</a:t>
+            </a:r>
+            <a:endParaRPr kumimoji="0" lang="ru-RU" sz="3600" b="0" i="0" u="none" strike="noStrike" cap="none" spc="0" normalizeH="0" baseline="0" dirty="0">
+              <a:ln>
+                <a:noFill/>
+              </a:ln>
+              <a:solidFill>
+                <a:srgbClr val="000000"/>
+              </a:solidFill>
+              <a:effectLst/>
+              <a:uFillTx/>
+              <a:latin typeface="+mn-lt"/>
+              <a:ea typeface="Helvetica Neue"/>
+              <a:cs typeface="Helvetica Neue"/>
+              <a:sym typeface="Helvetica Neue"/>
+            </a:endParaRPr>
+          </a:p>
+          <a:p>
+            <a:pPr algn="just" defTabSz="457248">
+              <a:lnSpc>
+                <a:spcPct val="120000"/>
+              </a:lnSpc>
+              <a:defRPr sz="2200" b="0">
+                <a:solidFill>
+                  <a:srgbClr val="7F8189"/>
+                </a:solidFill>
+                <a:latin typeface="Arial"/>
+                <a:ea typeface="Arial"/>
+                <a:cs typeface="Arial"/>
+                <a:sym typeface="Arial"/>
+              </a:defRPr>
+            </a:pPr>
+            <a:endParaRPr lang="ru-RU" sz="3600" dirty="0">
+              <a:solidFill>
+                <a:srgbClr val="131313"/>
+              </a:solidFill>
+              <a:latin typeface="Arial" panose="020B0604020202020204" pitchFamily="34" charset="0"/>
+              <a:cs typeface="Arial" panose="020B0604020202020204" pitchFamily="34" charset="0"/>
+            </a:endParaRPr>
           </a:p>
         </p:txBody>
       </p:sp>
@@ -10492,8 +12637,8 @@
         </p:blipFill>
         <p:spPr bwMode="auto">
           <a:xfrm>
-            <a:off x="699247" y="8865255"/>
-            <a:ext cx="6705600" cy="4086225"/>
+            <a:off x="699247" y="10220046"/>
+            <a:ext cx="4482353" cy="2731434"/>
           </a:xfrm>
           <a:prstGeom prst="rect">
             <a:avLst/>
@@ -10510,142 +12655,47 @@
           </a:extLst>
         </p:spPr>
       </p:pic>
-      <p:sp>
-        <p:nvSpPr>
-          <p:cNvPr id="3" name="TextBox 2">
+      <p:pic>
+        <p:nvPicPr>
+          <p:cNvPr id="2" name="Рисунок 1">
             <a:extLst>
               <a:ext uri="{FF2B5EF4-FFF2-40B4-BE49-F238E27FC236}">
-                <a16:creationId xmlns:a16="http://schemas.microsoft.com/office/drawing/2014/main" id="{C550ECBF-75FC-93C3-1F4A-5E0330EAA17D}"/>
+                <a16:creationId xmlns:a16="http://schemas.microsoft.com/office/drawing/2014/main" id="{CDA9DFB1-C2DF-DE49-46DC-1910E186748B}"/>
               </a:ext>
             </a:extLst>
           </p:cNvPr>
-          <p:cNvSpPr txBox="1"/>
+          <p:cNvPicPr>
+            <a:picLocks noChangeAspect="1"/>
+          </p:cNvPicPr>
           <p:nvPr/>
-        </p:nvSpPr>
-        <p:spPr>
+        </p:nvPicPr>
+        <p:blipFill>
+          <a:blip r:embed="rId3">
+            <a:extLst>
+              <a:ext uri="{28A0092B-C50C-407E-A947-70E740481C1C}">
+                <a14:useLocalDpi xmlns:a14="http://schemas.microsoft.com/office/drawing/2010/main" val="0"/>
+              </a:ext>
+            </a:extLst>
+          </a:blip>
+          <a:srcRect/>
+          <a:stretch>
+            <a:fillRect/>
+          </a:stretch>
+        </p:blipFill>
+        <p:spPr bwMode="auto">
           <a:xfrm>
-            <a:off x="8458199" y="8483502"/>
-            <a:ext cx="14652813" cy="3980577"/>
+            <a:off x="10632144" y="4338917"/>
+            <a:ext cx="12371292" cy="7422775"/>
           </a:xfrm>
           <a:prstGeom prst="rect">
             <a:avLst/>
           </a:prstGeom>
           <a:noFill/>
-          <a:ln w="12700" cap="flat">
+          <a:ln>
             <a:noFill/>
-            <a:miter lim="400000"/>
           </a:ln>
-          <a:effectLst/>
-          <a:sp3d/>
         </p:spPr>
-        <p:style>
-          <a:lnRef idx="0">
-            <a:scrgbClr r="0" g="0" b="0"/>
-          </a:lnRef>
-          <a:fillRef idx="0">
-            <a:scrgbClr r="0" g="0" b="0"/>
-          </a:fillRef>
-          <a:effectRef idx="0">
-            <a:scrgbClr r="0" g="0" b="0"/>
-          </a:effectRef>
-          <a:fontRef idx="none"/>
-        </p:style>
-        <p:txBody>
-          <a:bodyPr rot="0" spcFirstLastPara="1" vertOverflow="overflow" horzOverflow="overflow" vert="horz" wrap="square" lIns="50800" tIns="50800" rIns="50800" bIns="50800" numCol="1" spcCol="38100" rtlCol="0" anchor="ctr">
-            <a:spAutoFit/>
-          </a:bodyPr>
-          <a:lstStyle/>
-          <a:p>
-            <a:pPr marL="0" marR="0" indent="0" algn="just" defTabSz="825500" rtl="0" fontAlgn="auto" latinLnBrk="0" hangingPunct="0">
-              <a:lnSpc>
-                <a:spcPct val="100000"/>
-              </a:lnSpc>
-              <a:spcBef>
-                <a:spcPts val="0"/>
-              </a:spcBef>
-              <a:spcAft>
-                <a:spcPts val="0"/>
-              </a:spcAft>
-              <a:buClrTx/>
-              <a:buSzTx/>
-              <a:buFontTx/>
-              <a:buNone/>
-              <a:tabLst/>
-            </a:pPr>
-            <a:r>
-              <a:rPr lang="ru-RU" sz="3600" b="0" dirty="0">
-                <a:effectLst/>
-                <a:latin typeface="+mn-lt"/>
-                <a:ea typeface="Calibri" panose="020F0502020204030204" pitchFamily="34" charset="0"/>
-              </a:rPr>
-              <a:t>Первая компания на Российском рынке музыкальных инструментов, которая реализовала </a:t>
-            </a:r>
-            <a:r>
-              <a:rPr lang="ru-RU" sz="3600" b="0" dirty="0" err="1">
-                <a:effectLst/>
-                <a:latin typeface="+mn-lt"/>
-                <a:ea typeface="Calibri" panose="020F0502020204030204" pitchFamily="34" charset="0"/>
-              </a:rPr>
-              <a:t>омниканальный</a:t>
-            </a:r>
-            <a:r>
-              <a:rPr lang="ru-RU" sz="3600" b="0" dirty="0">
-                <a:effectLst/>
-                <a:latin typeface="+mn-lt"/>
-                <a:ea typeface="Calibri" panose="020F0502020204030204" pitchFamily="34" charset="0"/>
-              </a:rPr>
-              <a:t> подход: в магазинах и онлайн для покупателей всегда единые цены, ассортимент и сервис.</a:t>
-            </a:r>
-          </a:p>
-          <a:p>
-            <a:pPr marL="0" marR="0" indent="0" algn="just" defTabSz="825500" rtl="0" fontAlgn="auto" latinLnBrk="0" hangingPunct="0">
-              <a:lnSpc>
-                <a:spcPct val="100000"/>
-              </a:lnSpc>
-              <a:spcBef>
-                <a:spcPts val="0"/>
-              </a:spcBef>
-              <a:spcAft>
-                <a:spcPts val="0"/>
-              </a:spcAft>
-              <a:buClrTx/>
-              <a:buSzTx/>
-              <a:buFontTx/>
-              <a:buNone/>
-              <a:tabLst/>
-            </a:pPr>
-            <a:r>
-              <a:rPr kumimoji="0" lang="ru-RU" sz="3600" b="0" i="0" u="none" strike="noStrike" cap="none" spc="0" normalizeH="0" baseline="0" dirty="0">
-                <a:ln>
-                  <a:noFill/>
-                </a:ln>
-                <a:solidFill>
-                  <a:srgbClr val="000000"/>
-                </a:solidFill>
-                <a:uFillTx/>
-                <a:latin typeface="+mn-lt"/>
-                <a:cs typeface="Helvetica Neue"/>
-                <a:sym typeface="Helvetica Neue"/>
-              </a:rPr>
-              <a:t>ОКВЭД-2: 47.59.5: Торговля розничная музыкальными инструментами и нотными изданиями в специализированных магазинах.</a:t>
-            </a:r>
-            <a:endParaRPr kumimoji="0" lang="ru-RU" sz="3600" b="0" i="0" u="none" strike="noStrike" cap="none" spc="0" normalizeH="0" baseline="0" dirty="0">
-              <a:ln>
-                <a:noFill/>
-              </a:ln>
-              <a:solidFill>
-                <a:srgbClr val="000000"/>
-              </a:solidFill>
-              <a:effectLst/>
-              <a:uFillTx/>
-              <a:latin typeface="+mn-lt"/>
-              <a:ea typeface="Helvetica Neue"/>
-              <a:cs typeface="Helvetica Neue"/>
-              <a:sym typeface="Helvetica Neue"/>
-            </a:endParaRPr>
-          </a:p>
-        </p:txBody>
-      </p:sp>
+      </p:pic>
     </p:spTree>
   </p:cSld>
   <p:clrMapOvr>
@@ -10756,7 +12806,7 @@
           </a:ln>
           <a:extLst>
             <a:ext uri="{C572A759-6A51-4108-AA02-DFA0A04FC94B}">
-              <ma14:wrappingTextBoxFlag xmlns:ma14="http://schemas.microsoft.com/office/mac/drawingml/2011/main" xmlns:a14="http://schemas.microsoft.com/office/drawing/2010/main" xmlns:m="http://schemas.openxmlformats.org/officeDocument/2006/math" xmlns="" val="1"/>
+              <ma14:wrappingTextBoxFlag xmlns="" xmlns:m="http://schemas.openxmlformats.org/officeDocument/2006/math" xmlns:a14="http://schemas.microsoft.com/office/drawing/2010/main" xmlns:ma14="http://schemas.microsoft.com/office/mac/drawingml/2011/main" val="1"/>
             </a:ext>
           </a:extLst>
         </p:spPr>
@@ -10816,7 +12866,7 @@
           </a:ln>
           <a:extLst>
             <a:ext uri="{C572A759-6A51-4108-AA02-DFA0A04FC94B}">
-              <ma14:wrappingTextBoxFlag xmlns:ma14="http://schemas.microsoft.com/office/mac/drawingml/2011/main" xmlns:a14="http://schemas.microsoft.com/office/drawing/2010/main" xmlns:m="http://schemas.openxmlformats.org/officeDocument/2006/math" xmlns="" val="1"/>
+              <ma14:wrappingTextBoxFlag xmlns="" xmlns:m="http://schemas.openxmlformats.org/officeDocument/2006/math" xmlns:a14="http://schemas.microsoft.com/office/drawing/2010/main" xmlns:ma14="http://schemas.microsoft.com/office/mac/drawingml/2011/main" val="1"/>
             </a:ext>
           </a:extLst>
         </p:spPr>
@@ -10972,7 +13022,7 @@
           </a:ln>
           <a:extLst>
             <a:ext uri="{C572A759-6A51-4108-AA02-DFA0A04FC94B}">
-              <ma14:wrappingTextBoxFlag xmlns="" xmlns:m="http://schemas.openxmlformats.org/officeDocument/2006/math" xmlns:a14="http://schemas.microsoft.com/office/drawing/2010/main" xmlns:ma14="http://schemas.microsoft.com/office/mac/drawingml/2011/main" val="1"/>
+              <ma14:wrappingTextBoxFlag xmlns:ma14="http://schemas.microsoft.com/office/mac/drawingml/2011/main" xmlns:a14="http://schemas.microsoft.com/office/drawing/2010/main" xmlns:m="http://schemas.openxmlformats.org/officeDocument/2006/math" xmlns="" val="1"/>
             </a:ext>
           </a:extLst>
         </p:spPr>
@@ -11096,7 +13146,7 @@
           </a:ln>
           <a:extLst>
             <a:ext uri="{C572A759-6A51-4108-AA02-DFA0A04FC94B}">
-              <ma14:wrappingTextBoxFlag xmlns="" xmlns:m="http://schemas.openxmlformats.org/officeDocument/2006/math" xmlns:a14="http://schemas.microsoft.com/office/drawing/2010/main" xmlns:ma14="http://schemas.microsoft.com/office/mac/drawingml/2011/main" val="1"/>
+              <ma14:wrappingTextBoxFlag xmlns:ma14="http://schemas.microsoft.com/office/mac/drawingml/2011/main" xmlns:a14="http://schemas.microsoft.com/office/drawing/2010/main" xmlns:m="http://schemas.openxmlformats.org/officeDocument/2006/math" xmlns="" val="1"/>
             </a:ext>
           </a:extLst>
         </p:spPr>
@@ -11188,13 +13238,13 @@
   <p:clrMapOvr>
     <a:masterClrMapping/>
   </p:clrMapOvr>
-  <mc:AlternateContent xmlns:mc="http://schemas.openxmlformats.org/markup-compatibility/2006">
-    <mc:Choice xmlns:p14="http://schemas.microsoft.com/office/powerpoint/2010/main" Requires="p14">
+  <mc:AlternateContent xmlns:mc="http://schemas.openxmlformats.org/markup-compatibility/2006" xmlns:p14="http://schemas.microsoft.com/office/powerpoint/2010/main">
+    <mc:Choice Requires="p14">
       <p:transition spd="med" p14:dur="700">
         <p:fade/>
       </p:transition>
     </mc:Choice>
-    <mc:Fallback>
+    <mc:Fallback xmlns="">
       <p:transition spd="med">
         <p:fade/>
       </p:transition>
@@ -11251,7 +13301,7 @@
           </a:ln>
           <a:extLst>
             <a:ext uri="{C572A759-6A51-4108-AA02-DFA0A04FC94B}">
-              <ma14:wrappingTextBoxFlag xmlns:ma14="http://schemas.microsoft.com/office/mac/drawingml/2011/main" xmlns:a14="http://schemas.microsoft.com/office/drawing/2010/main" xmlns:m="http://schemas.openxmlformats.org/officeDocument/2006/math" xmlns="" val="1"/>
+              <ma14:wrappingTextBoxFlag xmlns="" xmlns:m="http://schemas.openxmlformats.org/officeDocument/2006/math" xmlns:a14="http://schemas.microsoft.com/office/drawing/2010/main" xmlns:ma14="http://schemas.microsoft.com/office/mac/drawingml/2011/main" val="1"/>
             </a:ext>
           </a:extLst>
         </p:spPr>
@@ -11375,7 +13425,7 @@
           </a:ln>
           <a:extLst>
             <a:ext uri="{C572A759-6A51-4108-AA02-DFA0A04FC94B}">
-              <ma14:wrappingTextBoxFlag xmlns:ma14="http://schemas.microsoft.com/office/mac/drawingml/2011/main" xmlns:a14="http://schemas.microsoft.com/office/drawing/2010/main" xmlns:m="http://schemas.openxmlformats.org/officeDocument/2006/math" xmlns="" val="1"/>
+              <ma14:wrappingTextBoxFlag xmlns="" xmlns:m="http://schemas.openxmlformats.org/officeDocument/2006/math" xmlns:a14="http://schemas.microsoft.com/office/drawing/2010/main" xmlns:ma14="http://schemas.microsoft.com/office/mac/drawingml/2011/main" val="1"/>
             </a:ext>
           </a:extLst>
         </p:spPr>
@@ -11467,13 +13517,13 @@
   <p:clrMapOvr>
     <a:masterClrMapping/>
   </p:clrMapOvr>
-  <mc:AlternateContent xmlns:mc="http://schemas.openxmlformats.org/markup-compatibility/2006">
-    <mc:Choice xmlns:p14="http://schemas.microsoft.com/office/powerpoint/2010/main" Requires="p14">
+  <mc:AlternateContent xmlns:mc="http://schemas.openxmlformats.org/markup-compatibility/2006" xmlns:p14="http://schemas.microsoft.com/office/powerpoint/2010/main">
+    <mc:Choice Requires="p14">
       <p:transition spd="med" p14:dur="700">
         <p:fade/>
       </p:transition>
     </mc:Choice>
-    <mc:Fallback>
+    <mc:Fallback xmlns="">
       <p:transition spd="med">
         <p:fade/>
       </p:transition>

</xml_diff>